<commit_message>
Update Excel & PPT
</commit_message>
<xml_diff>
--- a/Doc/Pre.pptx
+++ b/Doc/Pre.pptx
@@ -22,6 +22,12 @@
     <p:sldId id="272" r:id="rId16"/>
     <p:sldId id="273" r:id="rId17"/>
     <p:sldId id="274" r:id="rId18"/>
+    <p:sldId id="276" r:id="rId19"/>
+    <p:sldId id="278" r:id="rId20"/>
+    <p:sldId id="282" r:id="rId21"/>
+    <p:sldId id="279" r:id="rId22"/>
+    <p:sldId id="280" r:id="rId23"/>
+    <p:sldId id="281" r:id="rId24"/>
   </p:sldIdLst>
   <p:sldSz cx="12192000" cy="6858000"/>
   <p:notesSz cx="6858000" cy="9144000"/>
@@ -3861,6 +3867,10 @@
           <a:bodyPr/>
           <a:lstStyle/>
           <a:p>
+            <a:r>
+              <a:rPr kumimoji="1" lang="zh-CN" altLang="en-US"/>
+              <a:t>周植、胡子木、朱任翔</a:t>
+            </a:r>
             <a:endParaRPr kumimoji="1" lang="zh-CN" altLang="en-US" dirty="0"/>
           </a:p>
         </p:txBody>
@@ -4536,7 +4546,7 @@
           <a:p>
             <a:r>
               <a:rPr lang="en-US" altLang="zh-CN" dirty="0"/>
-              <a:t>Lasso</a:t>
+              <a:t>Lasso </a:t>
             </a:r>
             <a:r>
               <a:rPr lang="zh-CN" altLang="en-US" dirty="0"/>
@@ -4563,10 +4573,15 @@
                 <p:ph type="body" orient="vert" idx="1"/>
               </p:nvPr>
             </p:nvSpPr>
-            <p:spPr/>
+            <p:spPr>
+              <a:xfrm>
+                <a:off x="1371600" y="1854201"/>
+                <a:ext cx="9601200" cy="4013200"/>
+              </a:xfrm>
+            </p:spPr>
             <p:txBody>
               <a:bodyPr vert="horz">
-                <a:normAutofit/>
+                <a:normAutofit fontScale="92500"/>
               </a:bodyPr>
               <a:lstStyle/>
               <a:p>
@@ -4990,13 +5005,13 @@
                 <a14:m>
                   <m:oMath xmlns:m="http://schemas.openxmlformats.org/officeDocument/2006/math">
                     <m:r>
-                      <a:rPr lang="en-US" altLang="zh-CN" i="1" dirty="0" smtClean="0">
+                      <a:rPr lang="en-US" altLang="zh-CN" i="1" dirty="0">
                         <a:latin typeface="Cambria Math" panose="02040503050406030204" pitchFamily="18" charset="0"/>
                       </a:rPr>
                       <m:t>𝐿𝑜𝑠𝑠</m:t>
                     </m:r>
                     <m:r>
-                      <a:rPr lang="en-US" altLang="zh-CN" i="1" dirty="0" smtClean="0">
+                      <a:rPr lang="en-US" altLang="zh-CN" i="1" dirty="0">
                         <a:latin typeface="Cambria Math" panose="02040503050406030204" pitchFamily="18" charset="0"/>
                       </a:rPr>
                       <m:t> = </m:t>
@@ -5004,7 +5019,7 @@
                     <m:sSub>
                       <m:sSubPr>
                         <m:ctrlPr>
-                          <a:rPr lang="en-US" altLang="zh-CN" i="1" dirty="0" smtClean="0">
+                          <a:rPr lang="en-US" altLang="zh-CN" i="1" dirty="0">
                             <a:latin typeface="Cambria Math" panose="02040503050406030204" pitchFamily="18" charset="0"/>
                           </a:rPr>
                         </m:ctrlPr>
@@ -5013,7 +5028,7 @@
                         <m:sSub>
                           <m:sSubPr>
                             <m:ctrlPr>
-                              <a:rPr lang="en-US" altLang="zh-CN" b="0" i="1" dirty="0" smtClean="0">
+                              <a:rPr lang="en-US" altLang="zh-CN" i="1" dirty="0">
                                 <a:latin typeface="Cambria Math" panose="02040503050406030204" pitchFamily="18" charset="0"/>
                               </a:rPr>
                             </m:ctrlPr>
@@ -5024,7 +5039,7 @@
                                 <m:begChr m:val="|"/>
                                 <m:endChr m:val="|"/>
                                 <m:ctrlPr>
-                                  <a:rPr lang="en-US" altLang="zh-CN" b="0" i="1" dirty="0" smtClean="0">
+                                  <a:rPr lang="en-US" altLang="zh-CN" i="1" dirty="0">
                                     <a:latin typeface="Cambria Math" panose="02040503050406030204" pitchFamily="18" charset="0"/>
                                   </a:rPr>
                                 </m:ctrlPr>
@@ -5035,7 +5050,7 @@
                                     <m:begChr m:val="|"/>
                                     <m:endChr m:val="|"/>
                                     <m:ctrlPr>
-                                      <a:rPr lang="en-US" altLang="zh-CN" b="0" i="1" dirty="0" smtClean="0">
+                                      <a:rPr lang="en-US" altLang="zh-CN" i="1" dirty="0">
                                         <a:latin typeface="Cambria Math" panose="02040503050406030204" pitchFamily="18" charset="0"/>
                                       </a:rPr>
                                     </m:ctrlPr>
@@ -5044,14 +5059,14 @@
                                     <m:sSup>
                                       <m:sSupPr>
                                         <m:ctrlPr>
-                                          <a:rPr lang="en-US" altLang="zh-CN" b="0" i="1" dirty="0" smtClean="0">
+                                          <a:rPr lang="en-US" altLang="zh-CN" i="1" dirty="0">
                                             <a:latin typeface="Cambria Math" panose="02040503050406030204" pitchFamily="18" charset="0"/>
                                           </a:rPr>
                                         </m:ctrlPr>
                                       </m:sSupPr>
                                       <m:e>
                                         <m:r>
-                                          <a:rPr lang="en-US" altLang="zh-CN" b="0" i="1" dirty="0" smtClean="0">
+                                          <a:rPr lang="en-US" altLang="zh-CN" i="1" dirty="0">
                                             <a:latin typeface="Cambria Math" panose="02040503050406030204" pitchFamily="18" charset="0"/>
                                           </a:rPr>
                                           <m:t>𝐹</m:t>
@@ -5059,7 +5074,7 @@
                                       </m:e>
                                       <m:sup>
                                         <m:r>
-                                          <a:rPr lang="en-US" altLang="zh-CN" b="0" i="1" dirty="0" smtClean="0">
+                                          <a:rPr lang="en-US" altLang="zh-CN" i="1" dirty="0">
                                             <a:latin typeface="Cambria Math" panose="02040503050406030204" pitchFamily="18" charset="0"/>
                                           </a:rPr>
                                           <m:t>′</m:t>
@@ -5069,14 +5084,14 @@
                                     <m:d>
                                       <m:dPr>
                                         <m:ctrlPr>
-                                          <a:rPr lang="en-US" altLang="zh-CN" b="0" i="1" dirty="0" smtClean="0">
+                                          <a:rPr lang="en-US" altLang="zh-CN" i="1" dirty="0">
                                             <a:latin typeface="Cambria Math" panose="02040503050406030204" pitchFamily="18" charset="0"/>
                                           </a:rPr>
                                         </m:ctrlPr>
                                       </m:dPr>
                                       <m:e>
                                         <m:r>
-                                          <a:rPr lang="en-US" altLang="zh-CN" b="0" i="1" dirty="0" smtClean="0">
+                                          <a:rPr lang="en-US" altLang="zh-CN" i="1" dirty="0">
                                             <a:latin typeface="Cambria Math" panose="02040503050406030204" pitchFamily="18" charset="0"/>
                                           </a:rPr>
                                           <m:t>𝑋</m:t>
@@ -5084,13 +5099,13 @@
                                       </m:e>
                                     </m:d>
                                     <m:r>
-                                      <a:rPr lang="en-US" altLang="zh-CN" b="0" i="1" dirty="0" smtClean="0">
+                                      <a:rPr lang="en-US" altLang="zh-CN" i="1" dirty="0">
                                         <a:latin typeface="Cambria Math" panose="02040503050406030204" pitchFamily="18" charset="0"/>
                                       </a:rPr>
                                       <m:t>−</m:t>
                                     </m:r>
                                     <m:r>
-                                      <a:rPr lang="en-US" altLang="zh-CN" b="0" i="1" dirty="0" smtClean="0">
+                                      <a:rPr lang="en-US" altLang="zh-CN" i="1" dirty="0">
                                         <a:latin typeface="Cambria Math" panose="02040503050406030204" pitchFamily="18" charset="0"/>
                                       </a:rPr>
                                       <m:t>𝑌</m:t>
@@ -5102,7 +5117,7 @@
                           </m:e>
                           <m:sub>
                             <m:r>
-                              <a:rPr lang="en-US" altLang="zh-CN" b="0" i="1" dirty="0" smtClean="0">
+                              <a:rPr lang="en-US" altLang="zh-CN" i="1" dirty="0">
                                 <a:latin typeface="Cambria Math" panose="02040503050406030204" pitchFamily="18" charset="0"/>
                               </a:rPr>
                               <m:t>2</m:t>
@@ -5110,13 +5125,13 @@
                           </m:sub>
                         </m:sSub>
                         <m:r>
-                          <a:rPr lang="en-US" altLang="zh-CN" b="0" i="1" dirty="0" smtClean="0">
+                          <a:rPr lang="en-US" altLang="zh-CN" i="1" dirty="0">
                             <a:latin typeface="Cambria Math" panose="02040503050406030204" pitchFamily="18" charset="0"/>
                           </a:rPr>
                           <m:t>+</m:t>
                         </m:r>
                         <m:r>
-                          <a:rPr lang="en-US" altLang="zh-CN" b="0" i="1" dirty="0" smtClean="0">
+                          <a:rPr lang="en-US" altLang="zh-CN" i="1" dirty="0">
                             <a:latin typeface="Cambria Math" panose="02040503050406030204" pitchFamily="18" charset="0"/>
                           </a:rPr>
                           <m:t>𝜆</m:t>
@@ -5126,14 +5141,14 @@
                             <m:begChr m:val="|"/>
                             <m:endChr m:val="|"/>
                             <m:ctrlPr>
-                              <a:rPr lang="en-US" altLang="zh-CN" i="1" dirty="0" smtClean="0">
+                              <a:rPr lang="en-US" altLang="zh-CN" i="1" dirty="0">
                                 <a:latin typeface="Cambria Math" panose="02040503050406030204" pitchFamily="18" charset="0"/>
                               </a:rPr>
                             </m:ctrlPr>
                           </m:dPr>
                           <m:e>
                             <m:r>
-                              <a:rPr lang="en-US" altLang="zh-CN" i="1" dirty="0" smtClean="0">
+                              <a:rPr lang="en-US" altLang="zh-CN" i="1" dirty="0">
                                 <a:latin typeface="Cambria Math" panose="02040503050406030204" pitchFamily="18" charset="0"/>
                               </a:rPr>
                               <m:t>𝑉</m:t>
@@ -5143,7 +5158,7 @@
                       </m:e>
                       <m:sub>
                         <m:r>
-                          <a:rPr lang="en-US" altLang="zh-CN" i="1" dirty="0" smtClean="0">
+                          <a:rPr lang="en-US" altLang="zh-CN" i="1" dirty="0">
                             <a:latin typeface="Cambria Math" panose="02040503050406030204" pitchFamily="18" charset="0"/>
                           </a:rPr>
                           <m:t>1</m:t>
@@ -5152,6 +5167,23 @@
                     </m:sSub>
                   </m:oMath>
                 </a14:m>
+                <a:endParaRPr lang="en-US" altLang="zh-CN" dirty="0"/>
+              </a:p>
+              <a:p>
+                <a:endParaRPr lang="en-US" altLang="zh-CN" dirty="0"/>
+              </a:p>
+              <a:p>
+                <a:r>
+                  <a:rPr lang="en-US" altLang="zh-CN" dirty="0"/>
+                  <a:t>https://github.com/WNJXYK/JLU_FeatureSelection/blob/master/Algorithm/Lasso.py</a:t>
+                </a:r>
+              </a:p>
+              <a:p>
+                <a:pPr lvl="1"/>
+                <a:endParaRPr lang="en-US" altLang="zh-CN" dirty="0"/>
+              </a:p>
+              <a:p>
+                <a:pPr lvl="1"/>
                 <a:endParaRPr lang="en-US" altLang="zh-CN" dirty="0"/>
               </a:p>
               <a:p>
@@ -5193,10 +5225,14 @@
               </p:nvPr>
             </p:nvSpPr>
             <p:spPr>
+              <a:xfrm>
+                <a:off x="1371600" y="1854201"/>
+                <a:ext cx="9601200" cy="4013200"/>
+              </a:xfrm>
               <a:blipFill>
                 <a:blip r:embed="rId2"/>
                 <a:stretch>
-                  <a:fillRect l="-571" t="-1365"/>
+                  <a:fillRect l="-508" t="-1214" b="-910"/>
                 </a:stretch>
               </a:blipFill>
             </p:spPr>
@@ -5268,7 +5304,7 @@
           <a:p>
             <a:r>
               <a:rPr lang="en-US" altLang="zh-CN" dirty="0"/>
-              <a:t>Lasso</a:t>
+              <a:t>Lasso </a:t>
             </a:r>
             <a:r>
               <a:rPr lang="zh-CN" altLang="en-US" dirty="0"/>
@@ -8441,7 +8477,7 @@
           <a:p>
             <a:r>
               <a:rPr lang="en-US" altLang="zh-CN" dirty="0"/>
-              <a:t>Lasso</a:t>
+              <a:t>Lasso </a:t>
             </a:r>
             <a:r>
               <a:rPr lang="zh-CN" altLang="en-US" dirty="0"/>
@@ -9677,13 +9713,8 @@
           <a:p>
             <a:r>
               <a:rPr lang="zh-CN" altLang="en-US" dirty="0"/>
-              <a:t>改进得到 </a:t>
-            </a:r>
-            <a:r>
-              <a:rPr lang="en-US" altLang="zh-CN" dirty="0"/>
-              <a:t>GDFS</a:t>
-            </a:r>
-            <a:endParaRPr lang="zh-CN" altLang="en-US" dirty="0"/>
+              <a:t>尝试改进</a:t>
+            </a:r>
           </a:p>
         </p:txBody>
       </p:sp>
@@ -9895,7 +9926,7 @@
             </p:spPr>
             <p:txBody>
               <a:bodyPr vert="horz">
-                <a:normAutofit fontScale="92500" lnSpcReduction="10000"/>
+                <a:normAutofit fontScale="85000" lnSpcReduction="20000"/>
               </a:bodyPr>
               <a:lstStyle/>
               <a:p>
@@ -9936,13 +9967,13 @@
                 <a14:m>
                   <m:oMath xmlns:m="http://schemas.openxmlformats.org/officeDocument/2006/math">
                     <m:r>
-                      <a:rPr lang="en-US" altLang="zh-CN" i="1" dirty="0" smtClean="0">
+                      <a:rPr lang="en-US" altLang="zh-CN" dirty="0">
                         <a:latin typeface="Cambria Math" panose="02040503050406030204" pitchFamily="18" charset="0"/>
                       </a:rPr>
                       <m:t>𝑆𝑒𝑙</m:t>
                     </m:r>
                     <m:r>
-                      <a:rPr lang="en-US" altLang="zh-CN" i="1" dirty="0" smtClean="0">
+                      <a:rPr lang="en-US" altLang="zh-CN" dirty="0">
                         <a:latin typeface="Cambria Math" panose="02040503050406030204" pitchFamily="18" charset="0"/>
                       </a:rPr>
                       <m:t> = [1, 1, 1, …, 1]</m:t>
@@ -10323,6 +10354,15 @@
                 <a:endParaRPr lang="en-US" altLang="zh-CN" dirty="0"/>
               </a:p>
               <a:p>
+                <a:endParaRPr lang="en-US" altLang="zh-CN" dirty="0"/>
+              </a:p>
+              <a:p>
+                <a:r>
+                  <a:rPr lang="en-US" altLang="zh-CN" dirty="0"/>
+                  <a:t>https://github.com/WNJXYK/JLU_FeatureSelection/blob/master/Algorithm/GDFS.py</a:t>
+                </a:r>
+              </a:p>
+              <a:p>
                 <a:pPr marL="0" indent="0">
                   <a:buNone/>
                 </a:pPr>
@@ -10386,7 +10426,7 @@
               <a:blipFill>
                 <a:blip r:embed="rId2"/>
                 <a:stretch>
-                  <a:fillRect l="-508" t="-1705"/>
+                  <a:fillRect l="-317" t="-1563" b="-284"/>
                 </a:stretch>
               </a:blipFill>
             </p:spPr>
@@ -13631,7 +13671,7 @@
           <a:p>
             <a:r>
               <a:rPr lang="en-US" altLang="zh-CN" dirty="0"/>
-              <a:t>GDFS</a:t>
+              <a:t>GDFS </a:t>
             </a:r>
             <a:r>
               <a:rPr lang="zh-CN" altLang="en-US" dirty="0"/>
@@ -13746,6 +13786,1357 @@
     <p:extLst>
       <p:ext uri="{BB962C8B-B14F-4D97-AF65-F5344CB8AC3E}">
         <p14:creationId xmlns:p14="http://schemas.microsoft.com/office/powerpoint/2010/main" val="3756565263"/>
+      </p:ext>
+    </p:extLst>
+  </p:cSld>
+  <p:clrMapOvr>
+    <a:masterClrMapping/>
+  </p:clrMapOvr>
+</p:sld>
+</file>
+
+<file path=ppt/slides/slide18.xml><?xml version="1.0" encoding="utf-8"?>
+<p:sld xmlns:a="http://schemas.openxmlformats.org/drawingml/2006/main" xmlns:r="http://schemas.openxmlformats.org/officeDocument/2006/relationships" xmlns:p="http://schemas.openxmlformats.org/presentationml/2006/main">
+  <p:cSld>
+    <p:spTree>
+      <p:nvGrpSpPr>
+        <p:cNvPr id="1" name=""/>
+        <p:cNvGrpSpPr/>
+        <p:nvPr/>
+      </p:nvGrpSpPr>
+      <p:grpSpPr>
+        <a:xfrm>
+          <a:off x="0" y="0"/>
+          <a:ext cx="0" cy="0"/>
+          <a:chOff x="0" y="0"/>
+          <a:chExt cx="0" cy="0"/>
+        </a:xfrm>
+      </p:grpSpPr>
+      <p:sp>
+        <p:nvSpPr>
+          <p:cNvPr id="2" name="标题 1">
+            <a:extLst>
+              <a:ext uri="{FF2B5EF4-FFF2-40B4-BE49-F238E27FC236}">
+                <a16:creationId xmlns:a16="http://schemas.microsoft.com/office/drawing/2014/main" id="{814A3B83-F138-4CA9-ACDF-FD6D4313F32F}"/>
+              </a:ext>
+            </a:extLst>
+          </p:cNvPr>
+          <p:cNvSpPr>
+            <a:spLocks noGrp="1"/>
+          </p:cNvSpPr>
+          <p:nvPr>
+            <p:ph type="title"/>
+          </p:nvPr>
+        </p:nvSpPr>
+        <p:spPr/>
+        <p:txBody>
+          <a:bodyPr/>
+          <a:lstStyle/>
+          <a:p>
+            <a:r>
+              <a:rPr lang="zh-CN" altLang="en-US" dirty="0"/>
+              <a:t>另一种改进</a:t>
+            </a:r>
+          </a:p>
+        </p:txBody>
+      </p:sp>
+      <mc:AlternateContent xmlns:mc="http://schemas.openxmlformats.org/markup-compatibility/2006">
+        <mc:Choice xmlns:a14="http://schemas.microsoft.com/office/drawing/2010/main" Requires="a14">
+          <p:sp>
+            <p:nvSpPr>
+              <p:cNvPr id="3" name="竖排文字占位符 2">
+                <a:extLst>
+                  <a:ext uri="{FF2B5EF4-FFF2-40B4-BE49-F238E27FC236}">
+                    <a16:creationId xmlns:a16="http://schemas.microsoft.com/office/drawing/2014/main" id="{0DDDBC52-1374-4382-8C40-20FF63549B08}"/>
+                  </a:ext>
+                </a:extLst>
+              </p:cNvPr>
+              <p:cNvSpPr>
+                <a:spLocks noGrp="1"/>
+              </p:cNvSpPr>
+              <p:nvPr>
+                <p:ph type="body" orient="vert" idx="1"/>
+              </p:nvPr>
+            </p:nvSpPr>
+            <p:spPr>
+              <a:xfrm>
+                <a:off x="1371600" y="1997074"/>
+                <a:ext cx="9601200" cy="4175126"/>
+              </a:xfrm>
+            </p:spPr>
+            <p:txBody>
+              <a:bodyPr vert="horz">
+                <a:normAutofit/>
+              </a:bodyPr>
+              <a:lstStyle/>
+              <a:p>
+                <a:r>
+                  <a:rPr lang="zh-CN" altLang="en-US" dirty="0"/>
+                  <a:t>结合 </a:t>
+                </a:r>
+                <a:r>
+                  <a:rPr lang="en-US" altLang="zh-CN" dirty="0"/>
+                  <a:t>Lasso </a:t>
+                </a:r>
+                <a:r>
+                  <a:rPr lang="zh-CN" altLang="en-US" dirty="0"/>
+                  <a:t>大力度降维（高维下）和 </a:t>
+                </a:r>
+                <a:r>
+                  <a:rPr lang="en-US" altLang="zh-CN" dirty="0"/>
+                  <a:t>FOA </a:t>
+                </a:r>
+                <a:r>
+                  <a:rPr lang="zh-CN" altLang="en-US" dirty="0"/>
+                  <a:t>类算法的遗传思想。</a:t>
+                </a:r>
+                <a:endParaRPr lang="en-US" altLang="zh-CN" dirty="0"/>
+              </a:p>
+              <a:p>
+                <a:pPr lvl="1"/>
+                <a:r>
+                  <a:rPr lang="en-US" altLang="zh-CN" dirty="0"/>
+                  <a:t>Lasso </a:t>
+                </a:r>
+                <a:r>
+                  <a:rPr lang="zh-CN" altLang="en-US" dirty="0"/>
+                  <a:t>可以在保证准确率不下降太多的情况下，删除绝大多数特征。</a:t>
+                </a:r>
+                <a:endParaRPr lang="en-US" altLang="zh-CN" dirty="0"/>
+              </a:p>
+              <a:p>
+                <a:pPr lvl="1"/>
+                <a:r>
+                  <a:rPr lang="zh-CN" altLang="en-US" dirty="0"/>
+                  <a:t>使用遗传算法里的交叉、变异操作，跳出局部极值。</a:t>
+                </a:r>
+                <a:endParaRPr lang="en-US" altLang="zh-CN" dirty="0"/>
+              </a:p>
+              <a:p>
+                <a:endParaRPr lang="en-US" altLang="zh-CN" dirty="0"/>
+              </a:p>
+              <a:p>
+                <a:r>
+                  <a:rPr lang="zh-CN" altLang="en-US" dirty="0"/>
+                  <a:t>初始为了保证种群的丰富性，按照二进制位 </a:t>
+                </a:r>
+                <a:r>
+                  <a:rPr lang="en-US" altLang="zh-CN" dirty="0"/>
+                  <a:t>0/1 </a:t>
+                </a:r>
+                <a:r>
+                  <a:rPr lang="zh-CN" altLang="en-US" dirty="0"/>
+                  <a:t>生成 </a:t>
+                </a:r>
+                <a14:m>
+                  <m:oMath xmlns:m="http://schemas.openxmlformats.org/officeDocument/2006/math">
+                    <m:r>
+                      <a:rPr lang="en-US" altLang="zh-CN" i="1" dirty="0" smtClean="0">
+                        <a:latin typeface="Cambria Math" panose="02040503050406030204" pitchFamily="18" charset="0"/>
+                      </a:rPr>
+                      <m:t>2</m:t>
+                    </m:r>
+                    <m:r>
+                      <m:rPr>
+                        <m:sty m:val="p"/>
+                      </m:rPr>
+                      <a:rPr lang="en-US" altLang="zh-CN" i="1" dirty="0" smtClean="0">
+                        <a:latin typeface="Cambria Math" panose="02040503050406030204" pitchFamily="18" charset="0"/>
+                      </a:rPr>
+                      <m:t>log</m:t>
+                    </m:r>
+                    <m:r>
+                      <a:rPr lang="en-US" altLang="zh-CN" i="1" dirty="0" smtClean="0">
+                        <a:latin typeface="Cambria Math" panose="02040503050406030204" pitchFamily="18" charset="0"/>
+                      </a:rPr>
+                      <m:t>⁡(</m:t>
+                    </m:r>
+                    <m:sSub>
+                      <m:sSubPr>
+                        <m:ctrlPr>
+                          <a:rPr lang="en-US" altLang="zh-CN" i="1" dirty="0" err="1" smtClean="0">
+                            <a:latin typeface="Cambria Math" panose="02040503050406030204" pitchFamily="18" charset="0"/>
+                          </a:rPr>
+                        </m:ctrlPr>
+                      </m:sSubPr>
+                      <m:e>
+                        <m:r>
+                          <a:rPr lang="en-US" altLang="zh-CN" i="1" dirty="0" err="1" smtClean="0">
+                            <a:latin typeface="Cambria Math" panose="02040503050406030204" pitchFamily="18" charset="0"/>
+                          </a:rPr>
+                          <m:t>𝑛</m:t>
+                        </m:r>
+                      </m:e>
+                      <m:sub>
+                        <m:r>
+                          <a:rPr lang="en-US" altLang="zh-CN" i="1" dirty="0" err="1" smtClean="0">
+                            <a:latin typeface="Cambria Math" panose="02040503050406030204" pitchFamily="18" charset="0"/>
+                          </a:rPr>
+                          <m:t>𝑓𝑒𝑎𝑡𝑢𝑟𝑒𝑠</m:t>
+                        </m:r>
+                      </m:sub>
+                    </m:sSub>
+                    <m:r>
+                      <a:rPr lang="en-US" altLang="zh-CN" i="1" dirty="0" smtClean="0">
+                        <a:latin typeface="Cambria Math" panose="02040503050406030204" pitchFamily="18" charset="0"/>
+                      </a:rPr>
+                      <m:t>)</m:t>
+                    </m:r>
+                  </m:oMath>
+                </a14:m>
+                <a:r>
+                  <a:rPr lang="en-US" altLang="zh-CN" dirty="0"/>
+                  <a:t> </a:t>
+                </a:r>
+                <a:r>
+                  <a:rPr lang="zh-CN" altLang="en-US" dirty="0"/>
+                  <a:t>个大小为 </a:t>
+                </a:r>
+                <a14:m>
+                  <m:oMath xmlns:m="http://schemas.openxmlformats.org/officeDocument/2006/math">
+                    <m:f>
+                      <m:fPr>
+                        <m:type m:val="skw"/>
+                        <m:ctrlPr>
+                          <a:rPr lang="zh-CN" altLang="en-US" i="1" smtClean="0">
+                            <a:latin typeface="Cambria Math" panose="02040503050406030204" pitchFamily="18" charset="0"/>
+                          </a:rPr>
+                        </m:ctrlPr>
+                      </m:fPr>
+                      <m:num>
+                        <m:sSub>
+                          <m:sSubPr>
+                            <m:ctrlPr>
+                              <a:rPr lang="en-US" altLang="zh-CN" i="1">
+                                <a:latin typeface="Cambria Math" panose="02040503050406030204" pitchFamily="18" charset="0"/>
+                              </a:rPr>
+                            </m:ctrlPr>
+                          </m:sSubPr>
+                          <m:e>
+                            <m:r>
+                              <m:rPr>
+                                <m:sty m:val="p"/>
+                              </m:rPr>
+                              <a:rPr lang="en-US" altLang="zh-CN" i="1">
+                                <a:latin typeface="Cambria Math" panose="02040503050406030204" pitchFamily="18" charset="0"/>
+                              </a:rPr>
+                              <m:t>n</m:t>
+                            </m:r>
+                          </m:e>
+                          <m:sub>
+                            <m:r>
+                              <m:rPr>
+                                <m:sty m:val="p"/>
+                              </m:rPr>
+                              <a:rPr lang="en-US" altLang="zh-CN" i="1">
+                                <a:latin typeface="Cambria Math" panose="02040503050406030204" pitchFamily="18" charset="0"/>
+                              </a:rPr>
+                              <m:t>features</m:t>
+                            </m:r>
+                          </m:sub>
+                        </m:sSub>
+                      </m:num>
+                      <m:den>
+                        <m:r>
+                          <a:rPr lang="en-US" altLang="zh-CN" i="1">
+                            <a:latin typeface="Cambria Math" panose="02040503050406030204" pitchFamily="18" charset="0"/>
+                          </a:rPr>
+                          <m:t>2</m:t>
+                        </m:r>
+                      </m:den>
+                    </m:f>
+                  </m:oMath>
+                </a14:m>
+                <a:r>
+                  <a:rPr lang="en-US" altLang="zh-CN" dirty="0"/>
+                  <a:t> </a:t>
+                </a:r>
+                <a:r>
+                  <a:rPr lang="zh-CN" altLang="en-US" dirty="0"/>
+                  <a:t>的种群。</a:t>
+                </a:r>
+                <a:endParaRPr lang="en-US" altLang="zh-CN" dirty="0"/>
+              </a:p>
+              <a:p>
+                <a:r>
+                  <a:rPr lang="zh-CN" altLang="en-US" dirty="0"/>
+                  <a:t>修改交叉操作为或，变异操作仅为 </a:t>
+                </a:r>
+                <a14:m>
+                  <m:oMath xmlns:m="http://schemas.openxmlformats.org/officeDocument/2006/math">
+                    <m:r>
+                      <a:rPr lang="en-US" altLang="zh-CN" i="1" dirty="0" smtClean="0">
+                        <a:latin typeface="Cambria Math" panose="02040503050406030204" pitchFamily="18" charset="0"/>
+                      </a:rPr>
+                      <m:t>0→1</m:t>
+                    </m:r>
+                  </m:oMath>
+                </a14:m>
+                <a:endParaRPr lang="en-US" altLang="zh-CN" dirty="0"/>
+              </a:p>
+              <a:p>
+                <a:r>
+                  <a:rPr lang="zh-CN" altLang="en-US" dirty="0"/>
+                  <a:t>每次选择 </a:t>
+                </a:r>
+                <a:r>
+                  <a:rPr lang="en-US" altLang="zh-CN" dirty="0"/>
+                  <a:t>Fitness </a:t>
+                </a:r>
+                <a:r>
+                  <a:rPr lang="zh-CN" altLang="en-US" dirty="0"/>
+                  <a:t>最高的 </a:t>
+                </a:r>
+                <a14:m>
+                  <m:oMath xmlns:m="http://schemas.openxmlformats.org/officeDocument/2006/math">
+                    <m:r>
+                      <m:rPr>
+                        <m:sty m:val="p"/>
+                      </m:rPr>
+                      <a:rPr lang="en-US" altLang="zh-CN" b="0" i="0" smtClean="0">
+                        <a:latin typeface="Cambria Math" panose="02040503050406030204" pitchFamily="18" charset="0"/>
+                      </a:rPr>
+                      <m:t>O</m:t>
+                    </m:r>
+                    <m:r>
+                      <a:rPr lang="en-US" altLang="zh-CN" b="0" i="0" smtClean="0">
+                        <a:latin typeface="Cambria Math" panose="02040503050406030204" pitchFamily="18" charset="0"/>
+                      </a:rPr>
+                      <m:t>(</m:t>
+                    </m:r>
+                    <m:func>
+                      <m:funcPr>
+                        <m:ctrlPr>
+                          <a:rPr lang="en-US" altLang="zh-CN" b="0" i="1" smtClean="0">
+                            <a:latin typeface="Cambria Math" panose="02040503050406030204" pitchFamily="18" charset="0"/>
+                          </a:rPr>
+                        </m:ctrlPr>
+                      </m:funcPr>
+                      <m:fName>
+                        <m:sSub>
+                          <m:sSubPr>
+                            <m:ctrlPr>
+                              <a:rPr lang="en-US" altLang="zh-CN" b="0" i="0" smtClean="0">
+                                <a:latin typeface="Cambria Math" panose="02040503050406030204" pitchFamily="18" charset="0"/>
+                              </a:rPr>
+                            </m:ctrlPr>
+                          </m:sSubPr>
+                          <m:e>
+                            <m:r>
+                              <m:rPr>
+                                <m:sty m:val="p"/>
+                              </m:rPr>
+                              <a:rPr lang="en-US" altLang="zh-CN" b="0" i="0" smtClean="0">
+                                <a:latin typeface="Cambria Math" panose="02040503050406030204" pitchFamily="18" charset="0"/>
+                              </a:rPr>
+                              <m:t>log</m:t>
+                            </m:r>
+                          </m:e>
+                          <m:sub>
+                            <m:r>
+                              <a:rPr lang="en-US" altLang="zh-CN" b="0" i="1" smtClean="0">
+                                <a:latin typeface="Cambria Math" panose="02040503050406030204" pitchFamily="18" charset="0"/>
+                              </a:rPr>
+                              <m:t>2</m:t>
+                            </m:r>
+                          </m:sub>
+                        </m:sSub>
+                      </m:fName>
+                      <m:e>
+                        <m:sSub>
+                          <m:sSubPr>
+                            <m:ctrlPr>
+                              <a:rPr lang="en-US" altLang="zh-CN" b="0" i="1" smtClean="0">
+                                <a:latin typeface="Cambria Math" panose="02040503050406030204" pitchFamily="18" charset="0"/>
+                              </a:rPr>
+                            </m:ctrlPr>
+                          </m:sSubPr>
+                          <m:e>
+                            <m:r>
+                              <a:rPr lang="en-US" altLang="zh-CN" b="0" i="1" smtClean="0">
+                                <a:latin typeface="Cambria Math" panose="02040503050406030204" pitchFamily="18" charset="0"/>
+                              </a:rPr>
+                              <m:t>𝑛</m:t>
+                            </m:r>
+                          </m:e>
+                          <m:sub>
+                            <m:r>
+                              <a:rPr lang="en-US" altLang="zh-CN" b="0" i="1" smtClean="0">
+                                <a:latin typeface="Cambria Math" panose="02040503050406030204" pitchFamily="18" charset="0"/>
+                              </a:rPr>
+                              <m:t>𝑓𝑒𝑎𝑡𝑢𝑟𝑒𝑠</m:t>
+                            </m:r>
+                          </m:sub>
+                        </m:sSub>
+                      </m:e>
+                    </m:func>
+                    <m:r>
+                      <a:rPr lang="en-US" altLang="zh-CN" b="0" i="1" smtClean="0">
+                        <a:latin typeface="Cambria Math" panose="02040503050406030204" pitchFamily="18" charset="0"/>
+                      </a:rPr>
+                      <m:t>)</m:t>
+                    </m:r>
+                  </m:oMath>
+                </a14:m>
+                <a:r>
+                  <a:rPr lang="en-US" altLang="zh-CN" dirty="0"/>
+                  <a:t> </a:t>
+                </a:r>
+                <a:r>
+                  <a:rPr lang="zh-CN" altLang="en-US" dirty="0"/>
+                  <a:t>个个体保留，始终保持种群数量为 </a:t>
+                </a:r>
+                <a14:m>
+                  <m:oMath xmlns:m="http://schemas.openxmlformats.org/officeDocument/2006/math">
+                    <m:r>
+                      <a:rPr lang="en-US" altLang="zh-CN" i="1" dirty="0">
+                        <a:latin typeface="Cambria Math" panose="02040503050406030204" pitchFamily="18" charset="0"/>
+                      </a:rPr>
+                      <m:t>𝑂</m:t>
+                    </m:r>
+                    <m:r>
+                      <a:rPr lang="en-US" altLang="zh-CN" i="1" dirty="0">
+                        <a:latin typeface="Cambria Math" panose="02040503050406030204" pitchFamily="18" charset="0"/>
+                      </a:rPr>
+                      <m:t>(</m:t>
+                    </m:r>
+                    <m:func>
+                      <m:funcPr>
+                        <m:ctrlPr>
+                          <a:rPr lang="en-US" altLang="zh-CN" i="1" dirty="0">
+                            <a:latin typeface="Cambria Math" panose="02040503050406030204" pitchFamily="18" charset="0"/>
+                          </a:rPr>
+                        </m:ctrlPr>
+                      </m:funcPr>
+                      <m:fName>
+                        <m:sSub>
+                          <m:sSubPr>
+                            <m:ctrlPr>
+                              <a:rPr lang="en-US" altLang="zh-CN" i="1" dirty="0">
+                                <a:latin typeface="Cambria Math" panose="02040503050406030204" pitchFamily="18" charset="0"/>
+                              </a:rPr>
+                            </m:ctrlPr>
+                          </m:sSubPr>
+                          <m:e>
+                            <m:r>
+                              <m:rPr>
+                                <m:sty m:val="p"/>
+                              </m:rPr>
+                              <a:rPr lang="en-US" altLang="zh-CN" dirty="0">
+                                <a:latin typeface="Cambria Math" panose="02040503050406030204" pitchFamily="18" charset="0"/>
+                              </a:rPr>
+                              <m:t>log</m:t>
+                            </m:r>
+                          </m:e>
+                          <m:sub>
+                            <m:r>
+                              <a:rPr lang="en-US" altLang="zh-CN" i="1" dirty="0">
+                                <a:latin typeface="Cambria Math" panose="02040503050406030204" pitchFamily="18" charset="0"/>
+                              </a:rPr>
+                              <m:t>2</m:t>
+                            </m:r>
+                          </m:sub>
+                        </m:sSub>
+                      </m:fName>
+                      <m:e>
+                        <m:sSub>
+                          <m:sSubPr>
+                            <m:ctrlPr>
+                              <a:rPr lang="en-US" altLang="zh-CN" i="1" dirty="0">
+                                <a:latin typeface="Cambria Math" panose="02040503050406030204" pitchFamily="18" charset="0"/>
+                              </a:rPr>
+                            </m:ctrlPr>
+                          </m:sSubPr>
+                          <m:e>
+                            <m:r>
+                              <a:rPr lang="en-US" altLang="zh-CN" i="1" dirty="0">
+                                <a:latin typeface="Cambria Math" panose="02040503050406030204" pitchFamily="18" charset="0"/>
+                              </a:rPr>
+                              <m:t>𝑛</m:t>
+                            </m:r>
+                          </m:e>
+                          <m:sub>
+                            <m:r>
+                              <a:rPr lang="en-US" altLang="zh-CN" i="1" dirty="0">
+                                <a:latin typeface="Cambria Math" panose="02040503050406030204" pitchFamily="18" charset="0"/>
+                              </a:rPr>
+                              <m:t>𝑓𝑒𝑎𝑡𝑢𝑟𝑒𝑠</m:t>
+                            </m:r>
+                          </m:sub>
+                        </m:sSub>
+                      </m:e>
+                    </m:func>
+                    <m:r>
+                      <a:rPr lang="en-US" altLang="zh-CN" i="1" dirty="0">
+                        <a:latin typeface="Cambria Math" panose="02040503050406030204" pitchFamily="18" charset="0"/>
+                      </a:rPr>
+                      <m:t>)</m:t>
+                    </m:r>
+                  </m:oMath>
+                </a14:m>
+                <a:r>
+                  <a:rPr lang="en-US" altLang="zh-CN" dirty="0"/>
+                  <a:t> </a:t>
+                </a:r>
+                <a:r>
+                  <a:rPr lang="zh-CN" altLang="en-US" dirty="0"/>
+                  <a:t>级别，复杂度有保证</a:t>
+                </a:r>
+                <a:endParaRPr lang="en-US" altLang="zh-CN" dirty="0"/>
+              </a:p>
+              <a:p>
+                <a:r>
+                  <a:rPr lang="en-US" altLang="zh-CN" dirty="0"/>
+                  <a:t>Lasso </a:t>
+                </a:r>
+                <a:r>
+                  <a:rPr lang="zh-CN" altLang="en-US" dirty="0"/>
+                  <a:t>快速删除绝大多数无用特征，加速后期过程。</a:t>
+                </a:r>
+                <a:endParaRPr lang="en-US" altLang="zh-CN" dirty="0"/>
+              </a:p>
+              <a:p>
+                <a:endParaRPr lang="en-US" altLang="zh-CN" dirty="0"/>
+              </a:p>
+              <a:p>
+                <a:endParaRPr lang="en-US" altLang="zh-CN" dirty="0"/>
+              </a:p>
+              <a:p>
+                <a:pPr lvl="1"/>
+                <a:endParaRPr lang="en-US" altLang="zh-CN" dirty="0"/>
+              </a:p>
+              <a:p>
+                <a:pPr lvl="1"/>
+                <a:endParaRPr lang="en-US" altLang="zh-CN" dirty="0"/>
+              </a:p>
+              <a:p>
+                <a:endParaRPr lang="en-US" altLang="zh-CN" dirty="0"/>
+              </a:p>
+              <a:p>
+                <a:endParaRPr lang="en-US" altLang="zh-CN" dirty="0"/>
+              </a:p>
+            </p:txBody>
+          </p:sp>
+        </mc:Choice>
+        <mc:Fallback>
+          <p:sp>
+            <p:nvSpPr>
+              <p:cNvPr id="3" name="竖排文字占位符 2">
+                <a:extLst>
+                  <a:ext uri="{FF2B5EF4-FFF2-40B4-BE49-F238E27FC236}">
+                    <a16:creationId xmlns:a16="http://schemas.microsoft.com/office/drawing/2014/main" id="{0DDDBC52-1374-4382-8C40-20FF63549B08}"/>
+                  </a:ext>
+                </a:extLst>
+              </p:cNvPr>
+              <p:cNvSpPr>
+                <a:spLocks noGrp="1" noRot="1" noChangeAspect="1" noMove="1" noResize="1" noEditPoints="1" noAdjustHandles="1" noChangeArrowheads="1" noChangeShapeType="1" noTextEdit="1"/>
+              </p:cNvSpPr>
+              <p:nvPr>
+                <p:ph type="body" orient="vert" idx="1"/>
+              </p:nvPr>
+            </p:nvSpPr>
+            <p:spPr>
+              <a:xfrm>
+                <a:off x="1371600" y="1997074"/>
+                <a:ext cx="9601200" cy="4175126"/>
+              </a:xfrm>
+              <a:blipFill>
+                <a:blip r:embed="rId2"/>
+                <a:stretch>
+                  <a:fillRect l="-571" t="-1460"/>
+                </a:stretch>
+              </a:blipFill>
+            </p:spPr>
+            <p:txBody>
+              <a:bodyPr/>
+              <a:lstStyle/>
+              <a:p>
+                <a:r>
+                  <a:rPr lang="zh-CN" altLang="en-US">
+                    <a:noFill/>
+                  </a:rPr>
+                  <a:t> </a:t>
+                </a:r>
+              </a:p>
+            </p:txBody>
+          </p:sp>
+        </mc:Fallback>
+      </mc:AlternateContent>
+    </p:spTree>
+    <p:extLst>
+      <p:ext uri="{BB962C8B-B14F-4D97-AF65-F5344CB8AC3E}">
+        <p14:creationId xmlns:p14="http://schemas.microsoft.com/office/powerpoint/2010/main" val="731460833"/>
+      </p:ext>
+    </p:extLst>
+  </p:cSld>
+  <p:clrMapOvr>
+    <a:masterClrMapping/>
+  </p:clrMapOvr>
+</p:sld>
+</file>
+
+<file path=ppt/slides/slide19.xml><?xml version="1.0" encoding="utf-8"?>
+<p:sld xmlns:a="http://schemas.openxmlformats.org/drawingml/2006/main" xmlns:r="http://schemas.openxmlformats.org/officeDocument/2006/relationships" xmlns:p="http://schemas.openxmlformats.org/presentationml/2006/main">
+  <p:cSld>
+    <p:spTree>
+      <p:nvGrpSpPr>
+        <p:cNvPr id="1" name=""/>
+        <p:cNvGrpSpPr/>
+        <p:nvPr/>
+      </p:nvGrpSpPr>
+      <p:grpSpPr>
+        <a:xfrm>
+          <a:off x="0" y="0"/>
+          <a:ext cx="0" cy="0"/>
+          <a:chOff x="0" y="0"/>
+          <a:chExt cx="0" cy="0"/>
+        </a:xfrm>
+      </p:grpSpPr>
+      <p:sp>
+        <p:nvSpPr>
+          <p:cNvPr id="2" name="标题 1">
+            <a:extLst>
+              <a:ext uri="{FF2B5EF4-FFF2-40B4-BE49-F238E27FC236}">
+                <a16:creationId xmlns:a16="http://schemas.microsoft.com/office/drawing/2014/main" id="{814A3B83-F138-4CA9-ACDF-FD6D4313F32F}"/>
+              </a:ext>
+            </a:extLst>
+          </p:cNvPr>
+          <p:cNvSpPr>
+            <a:spLocks noGrp="1"/>
+          </p:cNvSpPr>
+          <p:nvPr>
+            <p:ph type="title"/>
+          </p:nvPr>
+        </p:nvSpPr>
+        <p:spPr/>
+        <p:txBody>
+          <a:bodyPr/>
+          <a:lstStyle/>
+          <a:p>
+            <a:r>
+              <a:rPr lang="en-US" altLang="zh-CN" dirty="0" err="1"/>
+              <a:t>LassoGA</a:t>
+            </a:r>
+            <a:endParaRPr lang="zh-CN" altLang="en-US" dirty="0"/>
+          </a:p>
+        </p:txBody>
+      </p:sp>
+      <mc:AlternateContent xmlns:mc="http://schemas.openxmlformats.org/markup-compatibility/2006">
+        <mc:Choice xmlns:a14="http://schemas.microsoft.com/office/drawing/2010/main" Requires="a14">
+          <p:sp>
+            <p:nvSpPr>
+              <p:cNvPr id="3" name="竖排文字占位符 2">
+                <a:extLst>
+                  <a:ext uri="{FF2B5EF4-FFF2-40B4-BE49-F238E27FC236}">
+                    <a16:creationId xmlns:a16="http://schemas.microsoft.com/office/drawing/2014/main" id="{0DDDBC52-1374-4382-8C40-20FF63549B08}"/>
+                  </a:ext>
+                </a:extLst>
+              </p:cNvPr>
+              <p:cNvSpPr>
+                <a:spLocks noGrp="1"/>
+              </p:cNvSpPr>
+              <p:nvPr>
+                <p:ph type="body" orient="vert" idx="1"/>
+              </p:nvPr>
+            </p:nvSpPr>
+            <p:spPr>
+              <a:xfrm>
+                <a:off x="1371600" y="1581151"/>
+                <a:ext cx="9601200" cy="4286250"/>
+              </a:xfrm>
+            </p:spPr>
+            <p:txBody>
+              <a:bodyPr vert="horz">
+                <a:normAutofit fontScale="92500" lnSpcReduction="20000"/>
+              </a:bodyPr>
+              <a:lstStyle/>
+              <a:p>
+                <a:r>
+                  <a:rPr lang="zh-CN" altLang="en-US" dirty="0"/>
+                  <a:t>使用 </a:t>
+                </a:r>
+                <a:r>
+                  <a:rPr lang="en-US" altLang="zh-CN" dirty="0"/>
+                  <a:t>0/1</a:t>
+                </a:r>
+                <a:r>
+                  <a:rPr lang="zh-CN" altLang="en-US" dirty="0"/>
+                  <a:t> 编码特征是否选择</a:t>
+                </a:r>
+                <a:endParaRPr lang="en-US" altLang="zh-CN" dirty="0"/>
+              </a:p>
+              <a:p>
+                <a:endParaRPr lang="en-US" altLang="zh-CN" dirty="0"/>
+              </a:p>
+              <a:p>
+                <a:r>
+                  <a:rPr lang="zh-CN" altLang="en-US" dirty="0"/>
+                  <a:t>算法过程：</a:t>
+                </a:r>
+                <a:endParaRPr lang="en-US" altLang="zh-CN" dirty="0"/>
+              </a:p>
+              <a:p>
+                <a:pPr marL="987552" lvl="1" indent="-457200">
+                  <a:buFont typeface="+mj-ea"/>
+                  <a:buAutoNum type="circleNumDbPlain"/>
+                </a:pPr>
+                <a:r>
+                  <a:rPr lang="zh-CN" altLang="en-US" dirty="0"/>
+                  <a:t>按每一位二进制</a:t>
+                </a:r>
+                <a:r>
+                  <a:rPr lang="en-US" altLang="zh-CN" dirty="0"/>
+                  <a:t>01</a:t>
+                </a:r>
+                <a:r>
+                  <a:rPr lang="zh-CN" altLang="en-US" dirty="0"/>
+                  <a:t>分组生成初始种群，并使用 </a:t>
+                </a:r>
+                <a:r>
+                  <a:rPr lang="en-US" altLang="zh-CN" dirty="0"/>
+                  <a:t>Lasso </a:t>
+                </a:r>
+                <a:r>
+                  <a:rPr lang="zh-CN" altLang="en-US" dirty="0"/>
+                  <a:t>降维</a:t>
+                </a:r>
+                <a:endParaRPr lang="en-US" altLang="zh-CN" dirty="0"/>
+              </a:p>
+              <a:p>
+                <a:pPr marL="987552" lvl="1" indent="-457200">
+                  <a:buFont typeface="+mj-ea"/>
+                  <a:buAutoNum type="circleNumDbPlain"/>
+                </a:pPr>
+                <a:r>
+                  <a:rPr lang="zh-CN" altLang="en-US" dirty="0"/>
+                  <a:t>令种群个体变异，进行 </a:t>
+                </a:r>
+                <a14:m>
+                  <m:oMath xmlns:m="http://schemas.openxmlformats.org/officeDocument/2006/math">
+                    <m:r>
+                      <a:rPr lang="en-US" altLang="zh-CN" dirty="0">
+                        <a:latin typeface="Cambria Math" panose="02040503050406030204" pitchFamily="18" charset="0"/>
+                      </a:rPr>
+                      <m:t>𝑚𝑢𝑡𝑎𝑡𝑖𝑜𝑛</m:t>
+                    </m:r>
+                    <m:r>
+                      <a:rPr lang="en-US" altLang="zh-CN" dirty="0">
+                        <a:latin typeface="Cambria Math" panose="02040503050406030204" pitchFamily="18" charset="0"/>
+                      </a:rPr>
+                      <m:t>_</m:t>
+                    </m:r>
+                    <m:r>
+                      <a:rPr lang="en-US" altLang="zh-CN" dirty="0">
+                        <a:latin typeface="Cambria Math" panose="02040503050406030204" pitchFamily="18" charset="0"/>
+                      </a:rPr>
+                      <m:t>𝑇</m:t>
+                    </m:r>
+                  </m:oMath>
+                </a14:m>
+                <a:r>
+                  <a:rPr lang="en-US" altLang="zh-CN" dirty="0"/>
+                  <a:t> </a:t>
+                </a:r>
+                <a:r>
+                  <a:rPr lang="zh-CN" altLang="en-US" dirty="0"/>
+                  <a:t>次 </a:t>
+                </a:r>
+                <a14:m>
+                  <m:oMath xmlns:m="http://schemas.openxmlformats.org/officeDocument/2006/math">
+                    <m:r>
+                      <a:rPr lang="en-US" altLang="zh-CN">
+                        <a:latin typeface="Cambria Math" panose="02040503050406030204" pitchFamily="18" charset="0"/>
+                      </a:rPr>
+                      <m:t>0→1</m:t>
+                    </m:r>
+                  </m:oMath>
+                </a14:m>
+                <a:r>
+                  <a:rPr lang="zh-CN" altLang="en-US" dirty="0"/>
+                  <a:t>。</a:t>
+                </a:r>
+                <a:endParaRPr lang="en-US" altLang="zh-CN" dirty="0"/>
+              </a:p>
+              <a:p>
+                <a:pPr lvl="2"/>
+                <a14:m>
+                  <m:oMath xmlns:m="http://schemas.openxmlformats.org/officeDocument/2006/math">
+                    <m:r>
+                      <a:rPr lang="en-US" altLang="zh-CN" i="1" dirty="0">
+                        <a:latin typeface="Cambria Math" panose="02040503050406030204" pitchFamily="18" charset="0"/>
+                      </a:rPr>
+                      <m:t>𝑚</m:t>
+                    </m:r>
+                    <m:r>
+                      <a:rPr lang="en-US" altLang="zh-CN" i="1" dirty="0" err="1">
+                        <a:latin typeface="Cambria Math" panose="02040503050406030204" pitchFamily="18" charset="0"/>
+                      </a:rPr>
+                      <m:t>𝑢</m:t>
+                    </m:r>
+                    <m:r>
+                      <a:rPr lang="en-US" altLang="zh-CN" i="1" dirty="0" err="1">
+                        <a:latin typeface="Cambria Math" panose="02040503050406030204" pitchFamily="18" charset="0"/>
+                      </a:rPr>
+                      <m:t>𝑡𝑎𝑡𝑖𝑜</m:t>
+                    </m:r>
+                    <m:r>
+                      <m:rPr>
+                        <m:sty m:val="p"/>
+                      </m:rPr>
+                      <a:rPr lang="en-US" altLang="zh-CN" i="1" dirty="0" err="1">
+                        <a:latin typeface="Cambria Math" panose="02040503050406030204" pitchFamily="18" charset="0"/>
+                      </a:rPr>
+                      <m:t>n</m:t>
+                    </m:r>
+                    <m:r>
+                      <a:rPr lang="en-US" altLang="zh-CN" i="1" dirty="0">
+                        <a:latin typeface="Cambria Math" panose="02040503050406030204" pitchFamily="18" charset="0"/>
+                      </a:rPr>
+                      <m:t>_</m:t>
+                    </m:r>
+                    <m:r>
+                      <a:rPr lang="en-US" altLang="zh-CN" i="1" dirty="0">
+                        <a:latin typeface="Cambria Math" panose="02040503050406030204" pitchFamily="18" charset="0"/>
+                      </a:rPr>
+                      <m:t>𝑇</m:t>
+                    </m:r>
+                    <m:r>
+                      <a:rPr lang="en-US" altLang="zh-CN" i="1" dirty="0">
+                        <a:latin typeface="Cambria Math" panose="02040503050406030204" pitchFamily="18" charset="0"/>
+                      </a:rPr>
+                      <m:t>=</m:t>
+                    </m:r>
+                    <m:func>
+                      <m:funcPr>
+                        <m:ctrlPr>
+                          <a:rPr lang="en-US" altLang="zh-CN" i="1" dirty="0">
+                            <a:latin typeface="Cambria Math" panose="02040503050406030204" pitchFamily="18" charset="0"/>
+                          </a:rPr>
+                        </m:ctrlPr>
+                      </m:funcPr>
+                      <m:fName>
+                        <m:r>
+                          <m:rPr>
+                            <m:sty m:val="p"/>
+                          </m:rPr>
+                          <a:rPr lang="en-US" altLang="zh-CN" dirty="0">
+                            <a:latin typeface="Cambria Math" panose="02040503050406030204" pitchFamily="18" charset="0"/>
+                          </a:rPr>
+                          <m:t>max</m:t>
+                        </m:r>
+                      </m:fName>
+                      <m:e>
+                        <m:d>
+                          <m:dPr>
+                            <m:ctrlPr>
+                              <a:rPr lang="en-US" altLang="zh-CN" i="1" dirty="0">
+                                <a:latin typeface="Cambria Math" panose="02040503050406030204" pitchFamily="18" charset="0"/>
+                              </a:rPr>
+                            </m:ctrlPr>
+                          </m:dPr>
+                          <m:e>
+                            <m:r>
+                              <a:rPr lang="en-US" altLang="zh-CN" i="1" dirty="0">
+                                <a:latin typeface="Cambria Math" panose="02040503050406030204" pitchFamily="18" charset="0"/>
+                              </a:rPr>
+                              <m:t>1,</m:t>
+                            </m:r>
+                            <m:f>
+                              <m:fPr>
+                                <m:ctrlPr>
+                                  <a:rPr lang="en-US" altLang="zh-CN" i="1" dirty="0">
+                                    <a:latin typeface="Cambria Math" panose="02040503050406030204" pitchFamily="18" charset="0"/>
+                                  </a:rPr>
+                                </m:ctrlPr>
+                              </m:fPr>
+                              <m:num>
+                                <m:sSub>
+                                  <m:sSubPr>
+                                    <m:ctrlPr>
+                                      <a:rPr lang="en-US" altLang="zh-CN" i="1" dirty="0">
+                                        <a:latin typeface="Cambria Math" panose="02040503050406030204" pitchFamily="18" charset="0"/>
+                                      </a:rPr>
+                                    </m:ctrlPr>
+                                  </m:sSubPr>
+                                  <m:e>
+                                    <m:r>
+                                      <a:rPr lang="en-US" altLang="zh-CN" i="1" dirty="0">
+                                        <a:latin typeface="Cambria Math" panose="02040503050406030204" pitchFamily="18" charset="0"/>
+                                      </a:rPr>
+                                      <m:t>𝑛</m:t>
+                                    </m:r>
+                                  </m:e>
+                                  <m:sub>
+                                    <m:r>
+                                      <a:rPr lang="en-US" altLang="zh-CN" i="1" dirty="0">
+                                        <a:latin typeface="Cambria Math" panose="02040503050406030204" pitchFamily="18" charset="0"/>
+                                      </a:rPr>
+                                      <m:t>𝑓𝑒𝑎𝑡𝑢𝑟𝑒𝑠</m:t>
+                                    </m:r>
+                                  </m:sub>
+                                </m:sSub>
+                              </m:num>
+                              <m:den>
+                                <m:r>
+                                  <a:rPr lang="en-US" altLang="zh-CN" i="1" dirty="0">
+                                    <a:latin typeface="Cambria Math" panose="02040503050406030204" pitchFamily="18" charset="0"/>
+                                  </a:rPr>
+                                  <m:t>2</m:t>
+                                </m:r>
+                              </m:den>
+                            </m:f>
+                            <m:r>
+                              <a:rPr lang="en-US" altLang="zh-CN" i="1" dirty="0">
+                                <a:latin typeface="Cambria Math" panose="02040503050406030204" pitchFamily="18" charset="0"/>
+                              </a:rPr>
+                              <m:t>×</m:t>
+                            </m:r>
+                            <m:func>
+                              <m:funcPr>
+                                <m:ctrlPr>
+                                  <a:rPr lang="en-US" altLang="zh-CN" i="1" dirty="0">
+                                    <a:latin typeface="Cambria Math" panose="02040503050406030204" pitchFamily="18" charset="0"/>
+                                  </a:rPr>
+                                </m:ctrlPr>
+                              </m:funcPr>
+                              <m:fName>
+                                <m:sSub>
+                                  <m:sSubPr>
+                                    <m:ctrlPr>
+                                      <a:rPr lang="en-US" altLang="zh-CN" i="1" dirty="0">
+                                        <a:latin typeface="Cambria Math" panose="02040503050406030204" pitchFamily="18" charset="0"/>
+                                      </a:rPr>
+                                    </m:ctrlPr>
+                                  </m:sSubPr>
+                                  <m:e>
+                                    <m:r>
+                                      <m:rPr>
+                                        <m:sty m:val="p"/>
+                                      </m:rPr>
+                                      <a:rPr lang="en-US" altLang="zh-CN" dirty="0">
+                                        <a:latin typeface="Cambria Math" panose="02040503050406030204" pitchFamily="18" charset="0"/>
+                                      </a:rPr>
+                                      <m:t>log</m:t>
+                                    </m:r>
+                                  </m:e>
+                                  <m:sub>
+                                    <m:r>
+                                      <a:rPr lang="en-US" altLang="zh-CN" i="1" dirty="0">
+                                        <a:latin typeface="Cambria Math" panose="02040503050406030204" pitchFamily="18" charset="0"/>
+                                      </a:rPr>
+                                      <m:t>2</m:t>
+                                    </m:r>
+                                  </m:sub>
+                                </m:sSub>
+                              </m:fName>
+                              <m:e>
+                                <m:f>
+                                  <m:fPr>
+                                    <m:ctrlPr>
+                                      <a:rPr lang="en-US" altLang="zh-CN" i="1" dirty="0">
+                                        <a:latin typeface="Cambria Math" panose="02040503050406030204" pitchFamily="18" charset="0"/>
+                                      </a:rPr>
+                                    </m:ctrlPr>
+                                  </m:fPr>
+                                  <m:num>
+                                    <m:d>
+                                      <m:dPr>
+                                        <m:ctrlPr>
+                                          <a:rPr lang="en-US" altLang="zh-CN" i="1" dirty="0">
+                                            <a:latin typeface="Cambria Math" panose="02040503050406030204" pitchFamily="18" charset="0"/>
+                                          </a:rPr>
+                                        </m:ctrlPr>
+                                      </m:dPr>
+                                      <m:e>
+                                        <m:r>
+                                          <a:rPr lang="en-US" altLang="zh-CN" i="1" dirty="0">
+                                            <a:latin typeface="Cambria Math" panose="02040503050406030204" pitchFamily="18" charset="0"/>
+                                          </a:rPr>
+                                          <m:t>𝑒𝑝𝑜𝑐h𝑠</m:t>
+                                        </m:r>
+                                        <m:r>
+                                          <a:rPr lang="en-US" altLang="zh-CN" i="1" dirty="0">
+                                            <a:latin typeface="Cambria Math" panose="02040503050406030204" pitchFamily="18" charset="0"/>
+                                          </a:rPr>
+                                          <m:t> −</m:t>
+                                        </m:r>
+                                        <m:r>
+                                          <a:rPr lang="en-US" altLang="zh-CN" i="1" dirty="0">
+                                            <a:latin typeface="Cambria Math" panose="02040503050406030204" pitchFamily="18" charset="0"/>
+                                          </a:rPr>
+                                          <m:t>𝑐𝑢𝑟</m:t>
+                                        </m:r>
+                                      </m:e>
+                                    </m:d>
+                                  </m:num>
+                                  <m:den>
+                                    <m:r>
+                                      <a:rPr lang="en-US" altLang="zh-CN" i="1" dirty="0">
+                                        <a:latin typeface="Cambria Math" panose="02040503050406030204" pitchFamily="18" charset="0"/>
+                                      </a:rPr>
+                                      <m:t>𝑒𝑝𝑜𝑐h𝑠</m:t>
+                                    </m:r>
+                                  </m:den>
+                                </m:f>
+                                <m:r>
+                                  <a:rPr lang="en-US" altLang="zh-CN" i="1" dirty="0">
+                                    <a:latin typeface="Cambria Math" panose="02040503050406030204" pitchFamily="18" charset="0"/>
+                                  </a:rPr>
+                                  <m:t> </m:t>
+                                </m:r>
+                              </m:e>
+                            </m:func>
+                          </m:e>
+                        </m:d>
+                      </m:e>
+                    </m:func>
+                  </m:oMath>
+                </a14:m>
+                <a:r>
+                  <a:rPr lang="en-US" altLang="zh-CN" dirty="0"/>
+                  <a:t> </a:t>
+                </a:r>
+                <a:r>
+                  <a:rPr lang="zh-CN" altLang="en-US" dirty="0"/>
+                  <a:t>随着轮次上升降低变异率</a:t>
+                </a:r>
+                <a:endParaRPr lang="en-US" altLang="zh-CN" dirty="0"/>
+              </a:p>
+              <a:p>
+                <a:pPr marL="987552" lvl="1" indent="-457200">
+                  <a:buFont typeface="+mj-ea"/>
+                  <a:buAutoNum type="circleNumDbPlain"/>
+                </a:pPr>
+                <a:r>
+                  <a:rPr lang="zh-CN" altLang="en-US" dirty="0"/>
+                  <a:t>选择适应度最高的 </a:t>
+                </a:r>
+                <a14:m>
+                  <m:oMath xmlns:m="http://schemas.openxmlformats.org/officeDocument/2006/math">
+                    <m:r>
+                      <a:rPr lang="en-US" altLang="zh-CN" dirty="0">
+                        <a:latin typeface="Cambria Math" panose="02040503050406030204" pitchFamily="18" charset="0"/>
+                      </a:rPr>
+                      <m:t>𝐾</m:t>
+                    </m:r>
+                  </m:oMath>
+                </a14:m>
+                <a:r>
+                  <a:rPr lang="en-US" altLang="zh-CN" dirty="0"/>
+                  <a:t> </a:t>
+                </a:r>
+                <a:r>
+                  <a:rPr lang="zh-CN" altLang="en-US" dirty="0"/>
+                  <a:t>个个体，随机与种群其他个体交叉。（控制交叉总次数为 </a:t>
+                </a:r>
+                <a14:m>
+                  <m:oMath xmlns:m="http://schemas.openxmlformats.org/officeDocument/2006/math">
+                    <m:func>
+                      <m:funcPr>
+                        <m:ctrlPr>
+                          <a:rPr lang="en-US" altLang="zh-CN">
+                            <a:latin typeface="Cambria Math" panose="02040503050406030204" pitchFamily="18" charset="0"/>
+                          </a:rPr>
+                        </m:ctrlPr>
+                      </m:funcPr>
+                      <m:fName>
+                        <m:sSub>
+                          <m:sSubPr>
+                            <m:ctrlPr>
+                              <a:rPr lang="en-US" altLang="zh-CN">
+                                <a:latin typeface="Cambria Math" panose="02040503050406030204" pitchFamily="18" charset="0"/>
+                              </a:rPr>
+                            </m:ctrlPr>
+                          </m:sSubPr>
+                          <m:e>
+                            <m:r>
+                              <m:rPr>
+                                <m:sty m:val="p"/>
+                              </m:rPr>
+                              <a:rPr lang="en-US" altLang="zh-CN" i="0">
+                                <a:latin typeface="Cambria Math" panose="02040503050406030204" pitchFamily="18" charset="0"/>
+                              </a:rPr>
+                              <m:t>O</m:t>
+                            </m:r>
+                            <m:r>
+                              <a:rPr lang="en-US" altLang="zh-CN" i="0">
+                                <a:latin typeface="Cambria Math" panose="02040503050406030204" pitchFamily="18" charset="0"/>
+                              </a:rPr>
+                              <m:t>(</m:t>
+                            </m:r>
+                            <m:r>
+                              <m:rPr>
+                                <m:sty m:val="p"/>
+                              </m:rPr>
+                              <a:rPr lang="en-US" altLang="zh-CN" i="0">
+                                <a:latin typeface="Cambria Math" panose="02040503050406030204" pitchFamily="18" charset="0"/>
+                              </a:rPr>
+                              <m:t>log</m:t>
+                            </m:r>
+                          </m:e>
+                          <m:sub>
+                            <m:r>
+                              <a:rPr lang="en-US" altLang="zh-CN">
+                                <a:latin typeface="Cambria Math" panose="02040503050406030204" pitchFamily="18" charset="0"/>
+                              </a:rPr>
+                              <m:t>2</m:t>
+                            </m:r>
+                          </m:sub>
+                        </m:sSub>
+                      </m:fName>
+                      <m:e>
+                        <m:sSub>
+                          <m:sSubPr>
+                            <m:ctrlPr>
+                              <a:rPr lang="en-US" altLang="zh-CN">
+                                <a:latin typeface="Cambria Math" panose="02040503050406030204" pitchFamily="18" charset="0"/>
+                              </a:rPr>
+                            </m:ctrlPr>
+                          </m:sSubPr>
+                          <m:e>
+                            <m:r>
+                              <a:rPr lang="en-US" altLang="zh-CN">
+                                <a:latin typeface="Cambria Math" panose="02040503050406030204" pitchFamily="18" charset="0"/>
+                              </a:rPr>
+                              <m:t>𝑛</m:t>
+                            </m:r>
+                          </m:e>
+                          <m:sub>
+                            <m:r>
+                              <a:rPr lang="en-US" altLang="zh-CN">
+                                <a:latin typeface="Cambria Math" panose="02040503050406030204" pitchFamily="18" charset="0"/>
+                              </a:rPr>
+                              <m:t>𝑓𝑒𝑎𝑡𝑢𝑟𝑒𝑠</m:t>
+                            </m:r>
+                          </m:sub>
+                        </m:sSub>
+                        <m:r>
+                          <a:rPr lang="en-US" altLang="zh-CN">
+                            <a:latin typeface="Cambria Math" panose="02040503050406030204" pitchFamily="18" charset="0"/>
+                          </a:rPr>
+                          <m:t>)</m:t>
+                        </m:r>
+                      </m:e>
+                    </m:func>
+                  </m:oMath>
+                </a14:m>
+                <a:endParaRPr lang="en-US" altLang="zh-CN" dirty="0"/>
+              </a:p>
+              <a:p>
+                <a:pPr marL="987552" lvl="1" indent="-457200">
+                  <a:buFont typeface="+mj-ea"/>
+                  <a:buAutoNum type="circleNumDbPlain"/>
+                </a:pPr>
+                <a:r>
+                  <a:rPr lang="zh-CN" altLang="en-US" dirty="0"/>
+                  <a:t>将变异种群和交叉种群，进行 </a:t>
+                </a:r>
+                <a:r>
+                  <a:rPr lang="en-US" altLang="zh-CN" dirty="0"/>
+                  <a:t>Lasso </a:t>
+                </a:r>
+                <a:r>
+                  <a:rPr lang="zh-CN" altLang="en-US" dirty="0"/>
+                  <a:t>降维</a:t>
+                </a:r>
+                <a:endParaRPr lang="en-US" altLang="zh-CN" dirty="0"/>
+              </a:p>
+              <a:p>
+                <a:pPr marL="987552" lvl="1" indent="-457200">
+                  <a:buFont typeface="+mj-ea"/>
+                  <a:buAutoNum type="circleNumDbPlain"/>
+                </a:pPr>
+                <a:r>
+                  <a:rPr lang="zh-CN" altLang="en-US" dirty="0"/>
+                  <a:t>合并原种群与变异种群、交叉种群，选择前 </a:t>
+                </a:r>
+                <a14:m>
+                  <m:oMath xmlns:m="http://schemas.openxmlformats.org/officeDocument/2006/math">
+                    <m:r>
+                      <a:rPr lang="en-US" altLang="zh-CN">
+                        <a:latin typeface="Cambria Math" panose="02040503050406030204" pitchFamily="18" charset="0"/>
+                      </a:rPr>
+                      <m:t>𝑂</m:t>
+                    </m:r>
+                    <m:d>
+                      <m:dPr>
+                        <m:ctrlPr>
+                          <a:rPr lang="en-US" altLang="zh-CN">
+                            <a:latin typeface="Cambria Math" panose="02040503050406030204" pitchFamily="18" charset="0"/>
+                          </a:rPr>
+                        </m:ctrlPr>
+                      </m:dPr>
+                      <m:e>
+                        <m:func>
+                          <m:funcPr>
+                            <m:ctrlPr>
+                              <a:rPr lang="en-US" altLang="zh-CN">
+                                <a:latin typeface="Cambria Math" panose="02040503050406030204" pitchFamily="18" charset="0"/>
+                              </a:rPr>
+                            </m:ctrlPr>
+                          </m:funcPr>
+                          <m:fName>
+                            <m:sSub>
+                              <m:sSubPr>
+                                <m:ctrlPr>
+                                  <a:rPr lang="en-US" altLang="zh-CN">
+                                    <a:latin typeface="Cambria Math" panose="02040503050406030204" pitchFamily="18" charset="0"/>
+                                  </a:rPr>
+                                </m:ctrlPr>
+                              </m:sSubPr>
+                              <m:e>
+                                <m:r>
+                                  <m:rPr>
+                                    <m:sty m:val="p"/>
+                                  </m:rPr>
+                                  <a:rPr lang="en-US" altLang="zh-CN" i="0">
+                                    <a:latin typeface="Cambria Math" panose="02040503050406030204" pitchFamily="18" charset="0"/>
+                                  </a:rPr>
+                                  <m:t>log</m:t>
+                                </m:r>
+                              </m:e>
+                              <m:sub>
+                                <m:r>
+                                  <a:rPr lang="en-US" altLang="zh-CN">
+                                    <a:latin typeface="Cambria Math" panose="02040503050406030204" pitchFamily="18" charset="0"/>
+                                  </a:rPr>
+                                  <m:t>2</m:t>
+                                </m:r>
+                              </m:sub>
+                            </m:sSub>
+                          </m:fName>
+                          <m:e>
+                            <m:sSub>
+                              <m:sSubPr>
+                                <m:ctrlPr>
+                                  <a:rPr lang="en-US" altLang="zh-CN">
+                                    <a:latin typeface="Cambria Math" panose="02040503050406030204" pitchFamily="18" charset="0"/>
+                                  </a:rPr>
+                                </m:ctrlPr>
+                              </m:sSubPr>
+                              <m:e>
+                                <m:r>
+                                  <a:rPr lang="en-US" altLang="zh-CN">
+                                    <a:latin typeface="Cambria Math" panose="02040503050406030204" pitchFamily="18" charset="0"/>
+                                  </a:rPr>
+                                  <m:t>𝑛</m:t>
+                                </m:r>
+                              </m:e>
+                              <m:sub>
+                                <m:r>
+                                  <a:rPr lang="en-US" altLang="zh-CN">
+                                    <a:latin typeface="Cambria Math" panose="02040503050406030204" pitchFamily="18" charset="0"/>
+                                  </a:rPr>
+                                  <m:t>𝑓𝑒𝑎𝑡𝑢𝑟𝑒𝑠</m:t>
+                                </m:r>
+                              </m:sub>
+                            </m:sSub>
+                          </m:e>
+                        </m:func>
+                      </m:e>
+                    </m:d>
+                  </m:oMath>
+                </a14:m>
+                <a:r>
+                  <a:rPr lang="en-US" altLang="zh-CN" dirty="0"/>
+                  <a:t> </a:t>
+                </a:r>
+                <a:r>
+                  <a:rPr lang="zh-CN" altLang="en-US" dirty="0"/>
+                  <a:t>个保留</a:t>
+                </a:r>
+                <a:endParaRPr lang="en-US" altLang="zh-CN" dirty="0"/>
+              </a:p>
+              <a:p>
+                <a:endParaRPr lang="en-US" altLang="zh-CN" dirty="0"/>
+              </a:p>
+              <a:p>
+                <a:r>
+                  <a:rPr lang="en-US" altLang="zh-CN" dirty="0"/>
+                  <a:t>https://github.com/WNJXYK/JLU_FeatureSelection/blob/master/Algorithm/LassoGA.py</a:t>
+                </a:r>
+              </a:p>
+              <a:p>
+                <a:pPr marL="530352" lvl="1" indent="0">
+                  <a:buNone/>
+                </a:pPr>
+                <a:endParaRPr lang="en-US" altLang="zh-CN" dirty="0"/>
+              </a:p>
+              <a:p>
+                <a:pPr marL="0" indent="0">
+                  <a:buNone/>
+                </a:pPr>
+                <a:endParaRPr lang="en-US" altLang="zh-CN" dirty="0"/>
+              </a:p>
+              <a:p>
+                <a:pPr lvl="1"/>
+                <a:endParaRPr lang="en-US" altLang="zh-CN" dirty="0"/>
+              </a:p>
+              <a:p>
+                <a:pPr lvl="1"/>
+                <a:endParaRPr lang="en-US" altLang="zh-CN" dirty="0"/>
+              </a:p>
+              <a:p>
+                <a:pPr lvl="1"/>
+                <a:endParaRPr lang="en-US" altLang="zh-CN" dirty="0"/>
+              </a:p>
+              <a:p>
+                <a:endParaRPr lang="en-US" altLang="zh-CN" dirty="0"/>
+              </a:p>
+              <a:p>
+                <a:endParaRPr lang="en-US" altLang="zh-CN" dirty="0"/>
+              </a:p>
+            </p:txBody>
+          </p:sp>
+        </mc:Choice>
+        <mc:Fallback>
+          <p:sp>
+            <p:nvSpPr>
+              <p:cNvPr id="3" name="竖排文字占位符 2">
+                <a:extLst>
+                  <a:ext uri="{FF2B5EF4-FFF2-40B4-BE49-F238E27FC236}">
+                    <a16:creationId xmlns:a16="http://schemas.microsoft.com/office/drawing/2014/main" id="{0DDDBC52-1374-4382-8C40-20FF63549B08}"/>
+                  </a:ext>
+                </a:extLst>
+              </p:cNvPr>
+              <p:cNvSpPr>
+                <a:spLocks noGrp="1" noRot="1" noChangeAspect="1" noMove="1" noResize="1" noEditPoints="1" noAdjustHandles="1" noChangeArrowheads="1" noChangeShapeType="1" noTextEdit="1"/>
+              </p:cNvSpPr>
+              <p:nvPr>
+                <p:ph type="body" orient="vert" idx="1"/>
+              </p:nvPr>
+            </p:nvSpPr>
+            <p:spPr>
+              <a:xfrm>
+                <a:off x="1371600" y="1581151"/>
+                <a:ext cx="9601200" cy="4286250"/>
+              </a:xfrm>
+              <a:blipFill>
+                <a:blip r:embed="rId2"/>
+                <a:stretch>
+                  <a:fillRect l="-508" t="-2557"/>
+                </a:stretch>
+              </a:blipFill>
+            </p:spPr>
+            <p:txBody>
+              <a:bodyPr/>
+              <a:lstStyle/>
+              <a:p>
+                <a:r>
+                  <a:rPr lang="zh-CN" altLang="en-US">
+                    <a:noFill/>
+                  </a:rPr>
+                  <a:t> </a:t>
+                </a:r>
+              </a:p>
+            </p:txBody>
+          </p:sp>
+        </mc:Fallback>
+      </mc:AlternateContent>
+    </p:spTree>
+    <p:extLst>
+      <p:ext uri="{BB962C8B-B14F-4D97-AF65-F5344CB8AC3E}">
+        <p14:creationId xmlns:p14="http://schemas.microsoft.com/office/powerpoint/2010/main" val="569500657"/>
       </p:ext>
     </p:extLst>
   </p:cSld>
@@ -14214,7 +15605,7 @@
                   <a:schemeClr val="bg2"/>
                 </a:solidFill>
               </a:rPr>
-              <a:t>降低数据维度，提升训练性能</a:t>
+              <a:t>降低数据维度，提升速度，增加性能</a:t>
             </a:r>
             <a:br>
               <a:rPr kumimoji="1" lang="en-US" altLang="zh-CN" sz="2400" dirty="0">
@@ -14247,6 +15638,503 @@
   </p:cSld>
   <p:clrMapOvr>
     <a:overrideClrMapping bg1="lt1" tx1="dk1" bg2="lt2" tx2="dk2" accent1="accent1" accent2="accent2" accent3="accent3" accent4="accent4" accent5="accent5" accent6="accent6" hlink="hlink" folHlink="folHlink"/>
+  </p:clrMapOvr>
+</p:sld>
+</file>
+
+<file path=ppt/slides/slide20.xml><?xml version="1.0" encoding="utf-8"?>
+<p:sld xmlns:a="http://schemas.openxmlformats.org/drawingml/2006/main" xmlns:r="http://schemas.openxmlformats.org/officeDocument/2006/relationships" xmlns:p="http://schemas.openxmlformats.org/presentationml/2006/main">
+  <p:cSld>
+    <p:spTree>
+      <p:nvGrpSpPr>
+        <p:cNvPr id="1" name=""/>
+        <p:cNvGrpSpPr/>
+        <p:nvPr/>
+      </p:nvGrpSpPr>
+      <p:grpSpPr>
+        <a:xfrm>
+          <a:off x="0" y="0"/>
+          <a:ext cx="0" cy="0"/>
+          <a:chOff x="0" y="0"/>
+          <a:chExt cx="0" cy="0"/>
+        </a:xfrm>
+      </p:grpSpPr>
+      <p:sp>
+        <p:nvSpPr>
+          <p:cNvPr id="2" name="标题 1">
+            <a:extLst>
+              <a:ext uri="{FF2B5EF4-FFF2-40B4-BE49-F238E27FC236}">
+                <a16:creationId xmlns:a16="http://schemas.microsoft.com/office/drawing/2014/main" id="{814A3B83-F138-4CA9-ACDF-FD6D4313F32F}"/>
+              </a:ext>
+            </a:extLst>
+          </p:cNvPr>
+          <p:cNvSpPr>
+            <a:spLocks noGrp="1"/>
+          </p:cNvSpPr>
+          <p:nvPr>
+            <p:ph type="title"/>
+          </p:nvPr>
+        </p:nvSpPr>
+        <p:spPr/>
+        <p:txBody>
+          <a:bodyPr/>
+          <a:lstStyle/>
+          <a:p>
+            <a:r>
+              <a:rPr lang="en-US" altLang="zh-CN" dirty="0" err="1"/>
+              <a:t>LassoGA</a:t>
+            </a:r>
+            <a:r>
+              <a:rPr lang="zh-CN" altLang="en-US" dirty="0"/>
+              <a:t>结果</a:t>
+            </a:r>
+          </a:p>
+        </p:txBody>
+      </p:sp>
+      <p:sp>
+        <p:nvSpPr>
+          <p:cNvPr id="5" name="文本占位符 4">
+            <a:extLst>
+              <a:ext uri="{FF2B5EF4-FFF2-40B4-BE49-F238E27FC236}">
+                <a16:creationId xmlns:a16="http://schemas.microsoft.com/office/drawing/2014/main" id="{2D5958B1-02F7-4619-9446-D71BE36EE40C}"/>
+              </a:ext>
+            </a:extLst>
+          </p:cNvPr>
+          <p:cNvSpPr>
+            <a:spLocks noGrp="1"/>
+          </p:cNvSpPr>
+          <p:nvPr>
+            <p:ph type="body" idx="1"/>
+          </p:nvPr>
+        </p:nvSpPr>
+        <p:spPr/>
+        <p:txBody>
+          <a:bodyPr/>
+          <a:lstStyle/>
+          <a:p>
+            <a:endParaRPr lang="zh-CN" altLang="en-US"/>
+          </a:p>
+        </p:txBody>
+      </p:sp>
+    </p:spTree>
+    <p:extLst>
+      <p:ext uri="{BB962C8B-B14F-4D97-AF65-F5344CB8AC3E}">
+        <p14:creationId xmlns:p14="http://schemas.microsoft.com/office/powerpoint/2010/main" val="1366090576"/>
+      </p:ext>
+    </p:extLst>
+  </p:cSld>
+  <p:clrMapOvr>
+    <a:masterClrMapping/>
+  </p:clrMapOvr>
+</p:sld>
+</file>
+
+<file path=ppt/slides/slide21.xml><?xml version="1.0" encoding="utf-8"?>
+<p:sld xmlns:a="http://schemas.openxmlformats.org/drawingml/2006/main" xmlns:r="http://schemas.openxmlformats.org/officeDocument/2006/relationships" xmlns:p="http://schemas.openxmlformats.org/presentationml/2006/main">
+  <p:cSld>
+    <p:spTree>
+      <p:nvGrpSpPr>
+        <p:cNvPr id="1" name=""/>
+        <p:cNvGrpSpPr/>
+        <p:nvPr/>
+      </p:nvGrpSpPr>
+      <p:grpSpPr>
+        <a:xfrm>
+          <a:off x="0" y="0"/>
+          <a:ext cx="0" cy="0"/>
+          <a:chOff x="0" y="0"/>
+          <a:chExt cx="0" cy="0"/>
+        </a:xfrm>
+      </p:grpSpPr>
+      <p:sp>
+        <p:nvSpPr>
+          <p:cNvPr id="2" name="标题 1">
+            <a:extLst>
+              <a:ext uri="{FF2B5EF4-FFF2-40B4-BE49-F238E27FC236}">
+                <a16:creationId xmlns:a16="http://schemas.microsoft.com/office/drawing/2014/main" id="{814A3B83-F138-4CA9-ACDF-FD6D4313F32F}"/>
+              </a:ext>
+            </a:extLst>
+          </p:cNvPr>
+          <p:cNvSpPr>
+            <a:spLocks noGrp="1"/>
+          </p:cNvSpPr>
+          <p:nvPr>
+            <p:ph type="title"/>
+          </p:nvPr>
+        </p:nvSpPr>
+        <p:spPr/>
+        <p:txBody>
+          <a:bodyPr/>
+          <a:lstStyle/>
+          <a:p>
+            <a:r>
+              <a:rPr lang="en-US" altLang="zh-CN" dirty="0" err="1"/>
+              <a:t>LassoGA</a:t>
+            </a:r>
+            <a:r>
+              <a:rPr lang="zh-CN" altLang="en-US" dirty="0"/>
+              <a:t>结果</a:t>
+            </a:r>
+          </a:p>
+        </p:txBody>
+      </p:sp>
+      <p:sp>
+        <p:nvSpPr>
+          <p:cNvPr id="3" name="竖排文字占位符 2">
+            <a:extLst>
+              <a:ext uri="{FF2B5EF4-FFF2-40B4-BE49-F238E27FC236}">
+                <a16:creationId xmlns:a16="http://schemas.microsoft.com/office/drawing/2014/main" id="{0DDDBC52-1374-4382-8C40-20FF63549B08}"/>
+              </a:ext>
+            </a:extLst>
+          </p:cNvPr>
+          <p:cNvSpPr>
+            <a:spLocks noGrp="1"/>
+          </p:cNvSpPr>
+          <p:nvPr>
+            <p:ph type="body" orient="vert" idx="1"/>
+          </p:nvPr>
+        </p:nvSpPr>
+        <p:spPr>
+          <a:xfrm>
+            <a:off x="1371600" y="2025650"/>
+            <a:ext cx="9601200" cy="3632200"/>
+          </a:xfrm>
+        </p:spPr>
+        <p:txBody>
+          <a:bodyPr vert="horz">
+            <a:normAutofit/>
+          </a:bodyPr>
+          <a:lstStyle/>
+          <a:p>
+            <a:r>
+              <a:rPr lang="zh-CN" altLang="en-US" dirty="0"/>
+              <a:t>未作</a:t>
+            </a:r>
+            <a:endParaRPr lang="en-US" altLang="zh-CN" dirty="0"/>
+          </a:p>
+          <a:p>
+            <a:pPr lvl="1"/>
+            <a:endParaRPr lang="en-US" altLang="zh-CN" dirty="0"/>
+          </a:p>
+          <a:p>
+            <a:endParaRPr lang="en-US" altLang="zh-CN" dirty="0"/>
+          </a:p>
+          <a:p>
+            <a:endParaRPr lang="en-US" altLang="zh-CN" dirty="0"/>
+          </a:p>
+        </p:txBody>
+      </p:sp>
+    </p:spTree>
+    <p:extLst>
+      <p:ext uri="{BB962C8B-B14F-4D97-AF65-F5344CB8AC3E}">
+        <p14:creationId xmlns:p14="http://schemas.microsoft.com/office/powerpoint/2010/main" val="2516251389"/>
+      </p:ext>
+    </p:extLst>
+  </p:cSld>
+  <p:clrMapOvr>
+    <a:masterClrMapping/>
+  </p:clrMapOvr>
+</p:sld>
+</file>
+
+<file path=ppt/slides/slide22.xml><?xml version="1.0" encoding="utf-8"?>
+<p:sld xmlns:a="http://schemas.openxmlformats.org/drawingml/2006/main" xmlns:r="http://schemas.openxmlformats.org/officeDocument/2006/relationships" xmlns:p="http://schemas.openxmlformats.org/presentationml/2006/main">
+  <p:cSld>
+    <p:spTree>
+      <p:nvGrpSpPr>
+        <p:cNvPr id="1" name=""/>
+        <p:cNvGrpSpPr/>
+        <p:nvPr/>
+      </p:nvGrpSpPr>
+      <p:grpSpPr>
+        <a:xfrm>
+          <a:off x="0" y="0"/>
+          <a:ext cx="0" cy="0"/>
+          <a:chOff x="0" y="0"/>
+          <a:chExt cx="0" cy="0"/>
+        </a:xfrm>
+      </p:grpSpPr>
+      <p:sp>
+        <p:nvSpPr>
+          <p:cNvPr id="4" name="标题 3">
+            <a:extLst>
+              <a:ext uri="{FF2B5EF4-FFF2-40B4-BE49-F238E27FC236}">
+                <a16:creationId xmlns:a16="http://schemas.microsoft.com/office/drawing/2014/main" id="{325CAF20-6162-46B1-BA2A-0C6584C371AE}"/>
+              </a:ext>
+            </a:extLst>
+          </p:cNvPr>
+          <p:cNvSpPr>
+            <a:spLocks noGrp="1"/>
+          </p:cNvSpPr>
+          <p:nvPr>
+            <p:ph type="ctrTitle"/>
+          </p:nvPr>
+        </p:nvSpPr>
+        <p:spPr/>
+        <p:txBody>
+          <a:bodyPr/>
+          <a:lstStyle/>
+          <a:p>
+            <a:r>
+              <a:rPr lang="en-US" altLang="zh-CN" dirty="0"/>
+              <a:t>Coda</a:t>
+            </a:r>
+            <a:endParaRPr lang="zh-CN" altLang="en-US" dirty="0"/>
+          </a:p>
+        </p:txBody>
+      </p:sp>
+      <p:sp>
+        <p:nvSpPr>
+          <p:cNvPr id="5" name="副标题 4">
+            <a:extLst>
+              <a:ext uri="{FF2B5EF4-FFF2-40B4-BE49-F238E27FC236}">
+                <a16:creationId xmlns:a16="http://schemas.microsoft.com/office/drawing/2014/main" id="{E295AE80-D370-4F27-9531-1420443550DA}"/>
+              </a:ext>
+            </a:extLst>
+          </p:cNvPr>
+          <p:cNvSpPr>
+            <a:spLocks noGrp="1"/>
+          </p:cNvSpPr>
+          <p:nvPr>
+            <p:ph type="subTitle" idx="1"/>
+          </p:nvPr>
+        </p:nvSpPr>
+        <p:spPr/>
+        <p:txBody>
+          <a:bodyPr/>
+          <a:lstStyle/>
+          <a:p>
+            <a:r>
+              <a:rPr lang="en-US" altLang="zh-CN" dirty="0"/>
+              <a:t>Thanks</a:t>
+            </a:r>
+            <a:endParaRPr lang="zh-CN" altLang="en-US" dirty="0"/>
+          </a:p>
+        </p:txBody>
+      </p:sp>
+    </p:spTree>
+    <p:extLst>
+      <p:ext uri="{BB962C8B-B14F-4D97-AF65-F5344CB8AC3E}">
+        <p14:creationId xmlns:p14="http://schemas.microsoft.com/office/powerpoint/2010/main" val="3337704441"/>
+      </p:ext>
+    </p:extLst>
+  </p:cSld>
+  <p:clrMapOvr>
+    <a:masterClrMapping/>
+  </p:clrMapOvr>
+</p:sld>
+</file>
+
+<file path=ppt/slides/slide23.xml><?xml version="1.0" encoding="utf-8"?>
+<p:sld xmlns:a="http://schemas.openxmlformats.org/drawingml/2006/main" xmlns:r="http://schemas.openxmlformats.org/officeDocument/2006/relationships" xmlns:p="http://schemas.openxmlformats.org/presentationml/2006/main">
+  <p:cSld>
+    <p:spTree>
+      <p:nvGrpSpPr>
+        <p:cNvPr id="1" name=""/>
+        <p:cNvGrpSpPr/>
+        <p:nvPr/>
+      </p:nvGrpSpPr>
+      <p:grpSpPr>
+        <a:xfrm>
+          <a:off x="0" y="0"/>
+          <a:ext cx="0" cy="0"/>
+          <a:chOff x="0" y="0"/>
+          <a:chExt cx="0" cy="0"/>
+        </a:xfrm>
+      </p:grpSpPr>
+      <p:sp>
+        <p:nvSpPr>
+          <p:cNvPr id="2" name="标题 1">
+            <a:extLst>
+              <a:ext uri="{FF2B5EF4-FFF2-40B4-BE49-F238E27FC236}">
+                <a16:creationId xmlns:a16="http://schemas.microsoft.com/office/drawing/2014/main" id="{6072A6FF-6A41-4677-938A-4F09DA7E00C5}"/>
+              </a:ext>
+            </a:extLst>
+          </p:cNvPr>
+          <p:cNvSpPr>
+            <a:spLocks noGrp="1"/>
+          </p:cNvSpPr>
+          <p:nvPr>
+            <p:ph type="title"/>
+          </p:nvPr>
+        </p:nvSpPr>
+        <p:spPr>
+          <a:xfrm>
+            <a:off x="1371600" y="685800"/>
+            <a:ext cx="9601200" cy="971550"/>
+          </a:xfrm>
+        </p:spPr>
+        <p:txBody>
+          <a:bodyPr/>
+          <a:lstStyle/>
+          <a:p>
+            <a:r>
+              <a:rPr lang="zh-CN" altLang="en-US" dirty="0"/>
+              <a:t>附录</a:t>
+            </a:r>
+          </a:p>
+        </p:txBody>
+      </p:sp>
+      <p:sp>
+        <p:nvSpPr>
+          <p:cNvPr id="3" name="内容占位符 2">
+            <a:extLst>
+              <a:ext uri="{FF2B5EF4-FFF2-40B4-BE49-F238E27FC236}">
+                <a16:creationId xmlns:a16="http://schemas.microsoft.com/office/drawing/2014/main" id="{12E3173C-3734-422A-8289-A24D4E391C4B}"/>
+              </a:ext>
+            </a:extLst>
+          </p:cNvPr>
+          <p:cNvSpPr>
+            <a:spLocks noGrp="1"/>
+          </p:cNvSpPr>
+          <p:nvPr>
+            <p:ph idx="1"/>
+          </p:nvPr>
+        </p:nvSpPr>
+        <p:spPr>
+          <a:xfrm>
+            <a:off x="1371600" y="1657350"/>
+            <a:ext cx="9601200" cy="4210050"/>
+          </a:xfrm>
+        </p:spPr>
+        <p:txBody>
+          <a:bodyPr/>
+          <a:lstStyle/>
+          <a:p>
+            <a:r>
+              <a:rPr lang="zh-CN" altLang="en-US" dirty="0"/>
+              <a:t>所有比较数据：</a:t>
+            </a:r>
+            <a:r>
+              <a:rPr lang="en-US" altLang="zh-CN" dirty="0"/>
+              <a:t> </a:t>
+            </a:r>
+            <a:r>
+              <a:rPr lang="en-US" altLang="zh-CN" sz="1400" dirty="0"/>
+              <a:t>https://github.com/WNJXYK/JLU_FeatureSelection/blob/master/Doc/Compare_Data.xlsx</a:t>
+            </a:r>
+          </a:p>
+          <a:p>
+            <a:endParaRPr lang="en-US" altLang="zh-CN" dirty="0"/>
+          </a:p>
+          <a:p>
+            <a:r>
+              <a:rPr lang="zh-CN" altLang="en-US" dirty="0"/>
+              <a:t>使用测试数据集：</a:t>
+            </a:r>
+            <a:r>
+              <a:rPr lang="en-US" altLang="zh-CN" dirty="0"/>
+              <a:t>Cleveland, Heart, Ionosphere, Vehicle, LSVT, </a:t>
+            </a:r>
+            <a:r>
+              <a:rPr lang="en-US" altLang="zh-CN" dirty="0" err="1"/>
+              <a:t>Srbct</a:t>
+            </a:r>
+            <a:r>
+              <a:rPr lang="en-US" altLang="zh-CN" dirty="0"/>
+              <a:t>, </a:t>
+            </a:r>
+            <a:r>
+              <a:rPr lang="en-US" altLang="zh-CN" dirty="0" err="1"/>
+              <a:t>Arcene</a:t>
+            </a:r>
+            <a:endParaRPr lang="en-US" altLang="zh-CN" dirty="0"/>
+          </a:p>
+          <a:p>
+            <a:endParaRPr lang="en-US" altLang="zh-CN" dirty="0"/>
+          </a:p>
+          <a:p>
+            <a:r>
+              <a:rPr lang="zh-CN" altLang="en-US" dirty="0"/>
+              <a:t>作业代码上传 </a:t>
+            </a:r>
+            <a:r>
+              <a:rPr lang="en-US" altLang="zh-CN" dirty="0" err="1"/>
+              <a:t>Github</a:t>
+            </a:r>
+            <a:r>
+              <a:rPr lang="zh-CN" altLang="en-US" dirty="0"/>
+              <a:t>：</a:t>
+            </a:r>
+            <a:r>
+              <a:rPr lang="en-US" altLang="zh-CN" dirty="0"/>
+              <a:t> https://github.com/WNJXYK/JLU_FeatureSelection</a:t>
+            </a:r>
+          </a:p>
+          <a:p>
+            <a:pPr lvl="1"/>
+            <a:r>
+              <a:rPr lang="zh-CN" altLang="en-US" dirty="0"/>
+              <a:t>算法代码在 </a:t>
+            </a:r>
+            <a:r>
+              <a:rPr lang="en-US" altLang="zh-CN" dirty="0"/>
+              <a:t>Algorithm </a:t>
+            </a:r>
+            <a:r>
+              <a:rPr lang="zh-CN" altLang="en-US" dirty="0"/>
+              <a:t>目录下</a:t>
+            </a:r>
+            <a:endParaRPr lang="en-US" altLang="zh-CN" dirty="0"/>
+          </a:p>
+          <a:p>
+            <a:pPr lvl="1"/>
+            <a:r>
+              <a:rPr lang="zh-CN" altLang="en-US" dirty="0"/>
+              <a:t>运行结果在 </a:t>
+            </a:r>
+            <a:r>
+              <a:rPr lang="en-US" altLang="zh-CN" dirty="0"/>
+              <a:t>Logs </a:t>
+            </a:r>
+            <a:r>
+              <a:rPr lang="zh-CN" altLang="en-US" dirty="0"/>
+              <a:t>目录下</a:t>
+            </a:r>
+            <a:endParaRPr lang="en-US" altLang="zh-CN" dirty="0"/>
+          </a:p>
+          <a:p>
+            <a:pPr lvl="1"/>
+            <a:r>
+              <a:rPr lang="zh-CN" altLang="en-US" dirty="0"/>
+              <a:t>数据比较 </a:t>
+            </a:r>
+            <a:r>
+              <a:rPr lang="en-US" altLang="zh-CN" dirty="0"/>
+              <a:t>Excel </a:t>
+            </a:r>
+            <a:r>
+              <a:rPr lang="zh-CN" altLang="en-US" dirty="0"/>
+              <a:t>与 </a:t>
+            </a:r>
+            <a:r>
+              <a:rPr lang="en-US" altLang="zh-CN" dirty="0"/>
+              <a:t>PowerPoint </a:t>
+            </a:r>
+            <a:r>
+              <a:rPr lang="zh-CN" altLang="en-US" dirty="0"/>
+              <a:t>在 </a:t>
+            </a:r>
+            <a:r>
+              <a:rPr lang="en-US" altLang="zh-CN" dirty="0"/>
+              <a:t>Doc </a:t>
+            </a:r>
+            <a:r>
+              <a:rPr lang="zh-CN" altLang="en-US" dirty="0"/>
+              <a:t>目录下</a:t>
+            </a:r>
+          </a:p>
+        </p:txBody>
+      </p:sp>
+    </p:spTree>
+    <p:extLst>
+      <p:ext uri="{BB962C8B-B14F-4D97-AF65-F5344CB8AC3E}">
+        <p14:creationId xmlns:p14="http://schemas.microsoft.com/office/powerpoint/2010/main" val="1392729890"/>
+      </p:ext>
+    </p:extLst>
+  </p:cSld>
+  <p:clrMapOvr>
+    <a:masterClrMapping/>
   </p:clrMapOvr>
 </p:sld>
 </file>
@@ -14544,6 +16432,10 @@
             <a:r>
               <a:rPr kumimoji="1" lang="zh-CN" altLang="en-US" dirty="0"/>
               <a:t>将随机化与数值进化进行结合：</a:t>
+            </a:r>
+            <a:r>
+              <a:rPr kumimoji="1" lang="en-US" altLang="zh-CN" dirty="0" err="1"/>
+              <a:t>LassoGA</a:t>
             </a:r>
             <a:endParaRPr kumimoji="1" lang="en-US" altLang="zh-CN" dirty="0"/>
           </a:p>

</xml_diff>

<commit_message>
Update PowerPoint & Excel
</commit_message>
<xml_diff>
--- a/Doc/Pre.pptx
+++ b/Doc/Pre.pptx
@@ -305,7 +305,7 @@
             <a:fld id="{87DE6118-2437-4B30-8E3C-4D2BE6020583}" type="datetimeFigureOut">
               <a:rPr lang="en-US" dirty="0"/>
               <a:pPr/>
-              <a:t>9/24/2019</a:t>
+              <a:t>9/25/19</a:t>
             </a:fld>
             <a:endParaRPr lang="en-US" dirty="0"/>
           </a:p>
@@ -631,7 +631,7 @@
           <a:p>
             <a:fld id="{87DE6118-2437-4B30-8E3C-4D2BE6020583}" type="datetimeFigureOut">
               <a:rPr lang="en-US" dirty="0"/>
-              <a:t>9/24/2019</a:t>
+              <a:t>9/25/19</a:t>
             </a:fld>
             <a:endParaRPr lang="en-US" dirty="0"/>
           </a:p>
@@ -806,7 +806,7 @@
           <a:p>
             <a:fld id="{87DE6118-2437-4B30-8E3C-4D2BE6020583}" type="datetimeFigureOut">
               <a:rPr lang="en-US" dirty="0"/>
-              <a:t>9/24/2019</a:t>
+              <a:t>9/25/19</a:t>
             </a:fld>
             <a:endParaRPr lang="en-US" dirty="0"/>
           </a:p>
@@ -971,7 +971,7 @@
           <a:p>
             <a:fld id="{87DE6118-2437-4B30-8E3C-4D2BE6020583}" type="datetimeFigureOut">
               <a:rPr lang="en-US" dirty="0"/>
-              <a:t>9/24/2019</a:t>
+              <a:t>9/25/19</a:t>
             </a:fld>
             <a:endParaRPr lang="en-US" dirty="0"/>
           </a:p>
@@ -1244,7 +1244,7 @@
             <a:fld id="{87DE6118-2437-4B30-8E3C-4D2BE6020583}" type="datetimeFigureOut">
               <a:rPr lang="en-US" dirty="0"/>
               <a:pPr/>
-              <a:t>9/24/2019</a:t>
+              <a:t>9/25/19</a:t>
             </a:fld>
             <a:endParaRPr lang="en-US" dirty="0"/>
           </a:p>
@@ -1634,7 +1634,7 @@
           <a:p>
             <a:fld id="{87DE6118-2437-4B30-8E3C-4D2BE6020583}" type="datetimeFigureOut">
               <a:rPr lang="en-US" dirty="0"/>
-              <a:t>9/24/2019</a:t>
+              <a:t>9/25/19</a:t>
             </a:fld>
             <a:endParaRPr lang="en-US" dirty="0"/>
           </a:p>
@@ -2106,7 +2106,7 @@
           <a:p>
             <a:fld id="{87DE6118-2437-4B30-8E3C-4D2BE6020583}" type="datetimeFigureOut">
               <a:rPr lang="en-US" dirty="0"/>
-              <a:t>9/24/2019</a:t>
+              <a:t>9/25/19</a:t>
             </a:fld>
             <a:endParaRPr lang="en-US" dirty="0"/>
           </a:p>
@@ -2219,7 +2219,7 @@
           <a:p>
             <a:fld id="{87DE6118-2437-4B30-8E3C-4D2BE6020583}" type="datetimeFigureOut">
               <a:rPr lang="en-US" dirty="0"/>
-              <a:t>9/24/2019</a:t>
+              <a:t>9/25/19</a:t>
             </a:fld>
             <a:endParaRPr lang="en-US" dirty="0"/>
           </a:p>
@@ -2309,7 +2309,7 @@
           <a:p>
             <a:fld id="{87DE6118-2437-4B30-8E3C-4D2BE6020583}" type="datetimeFigureOut">
               <a:rPr lang="en-US" dirty="0"/>
-              <a:t>9/24/2019</a:t>
+              <a:t>9/25/19</a:t>
             </a:fld>
             <a:endParaRPr lang="en-US" dirty="0"/>
           </a:p>
@@ -2651,7 +2651,7 @@
             <a:fld id="{87DE6118-2437-4B30-8E3C-4D2BE6020583}" type="datetimeFigureOut">
               <a:rPr lang="en-US" dirty="0"/>
               <a:pPr/>
-              <a:t>9/24/2019</a:t>
+              <a:t>9/25/19</a:t>
             </a:fld>
             <a:endParaRPr lang="en-US" dirty="0"/>
           </a:p>
@@ -3036,7 +3036,7 @@
             <a:fld id="{87DE6118-2437-4B30-8E3C-4D2BE6020583}" type="datetimeFigureOut">
               <a:rPr lang="en-US" dirty="0"/>
               <a:pPr/>
-              <a:t>9/24/2019</a:t>
+              <a:t>9/25/19</a:t>
             </a:fld>
             <a:endParaRPr lang="en-US" dirty="0"/>
           </a:p>
@@ -3311,7 +3311,7 @@
             <a:fld id="{87DE6118-2437-4B30-8E3C-4D2BE6020583}" type="datetimeFigureOut">
               <a:rPr lang="en-US" dirty="0"/>
               <a:pPr/>
-              <a:t>9/24/2019</a:t>
+              <a:t>9/25/19</a:t>
             </a:fld>
             <a:endParaRPr lang="en-US" dirty="0"/>
           </a:p>
@@ -4555,8 +4555,8 @@
           </a:p>
         </p:txBody>
       </p:sp>
-      <mc:AlternateContent xmlns:mc="http://schemas.openxmlformats.org/markup-compatibility/2006">
-        <mc:Choice xmlns:a14="http://schemas.microsoft.com/office/drawing/2010/main" Requires="a14">
+      <mc:AlternateContent xmlns:mc="http://schemas.openxmlformats.org/markup-compatibility/2006" xmlns:a14="http://schemas.microsoft.com/office/drawing/2010/main">
+        <mc:Choice Requires="a14">
           <p:sp>
             <p:nvSpPr>
               <p:cNvPr id="3" name="竖排文字占位符 2">
@@ -5207,7 +5207,7 @@
             </p:txBody>
           </p:sp>
         </mc:Choice>
-        <mc:Fallback>
+        <mc:Fallback xmlns="">
           <p:sp>
             <p:nvSpPr>
               <p:cNvPr id="3" name="竖排文字占位符 2">
@@ -8486,8 +8486,8 @@
           </a:p>
         </p:txBody>
       </p:sp>
-      <mc:AlternateContent xmlns:mc="http://schemas.openxmlformats.org/markup-compatibility/2006">
-        <mc:Choice xmlns:a14="http://schemas.microsoft.com/office/drawing/2010/main" Requires="a14">
+      <mc:AlternateContent xmlns:mc="http://schemas.openxmlformats.org/markup-compatibility/2006" xmlns:a14="http://schemas.microsoft.com/office/drawing/2010/main">
+        <mc:Choice Requires="a14">
           <p:sp>
             <p:nvSpPr>
               <p:cNvPr id="3" name="竖排文字占位符 2">
@@ -8641,7 +8641,7 @@
             </p:txBody>
           </p:sp>
         </mc:Choice>
-        <mc:Fallback>
+        <mc:Fallback xmlns="">
           <p:sp>
             <p:nvSpPr>
               <p:cNvPr id="3" name="竖排文字占位符 2">
@@ -9900,8 +9900,8 @@
           </a:p>
         </p:txBody>
       </p:sp>
-      <mc:AlternateContent xmlns:mc="http://schemas.openxmlformats.org/markup-compatibility/2006">
-        <mc:Choice xmlns:a14="http://schemas.microsoft.com/office/drawing/2010/main" Requires="a14">
+      <mc:AlternateContent xmlns:mc="http://schemas.openxmlformats.org/markup-compatibility/2006" xmlns:a14="http://schemas.microsoft.com/office/drawing/2010/main">
+        <mc:Choice Requires="a14">
           <p:sp>
             <p:nvSpPr>
               <p:cNvPr id="3" name="竖排文字占位符 2">
@@ -10401,7 +10401,7 @@
             </p:txBody>
           </p:sp>
         </mc:Choice>
-        <mc:Fallback>
+        <mc:Fallback xmlns="">
           <p:sp>
             <p:nvSpPr>
               <p:cNvPr id="3" name="竖排文字占位符 2">
@@ -13840,8 +13840,8 @@
           </a:p>
         </p:txBody>
       </p:sp>
-      <mc:AlternateContent xmlns:mc="http://schemas.openxmlformats.org/markup-compatibility/2006">
-        <mc:Choice xmlns:a14="http://schemas.microsoft.com/office/drawing/2010/main" Requires="a14">
+      <mc:AlternateContent xmlns:mc="http://schemas.openxmlformats.org/markup-compatibility/2006" xmlns:a14="http://schemas.microsoft.com/office/drawing/2010/main">
+        <mc:Choice Requires="a14">
           <p:sp>
             <p:nvSpPr>
               <p:cNvPr id="3" name="竖排文字占位符 2">
@@ -14116,7 +14116,7 @@
                         <m:sSub>
                           <m:sSubPr>
                             <m:ctrlPr>
-                              <a:rPr lang="en-US" altLang="zh-CN" b="0" i="0" smtClean="0">
+                              <a:rPr lang="en-US" altLang="zh-CN" b="0" i="1" smtClean="0">
                                 <a:latin typeface="Cambria Math" panose="02040503050406030204" pitchFamily="18" charset="0"/>
                               </a:rPr>
                             </m:ctrlPr>
@@ -14318,7 +14318,7 @@
             </p:txBody>
           </p:sp>
         </mc:Choice>
-        <mc:Fallback>
+        <mc:Fallback xmlns="">
           <p:sp>
             <p:nvSpPr>
               <p:cNvPr id="3" name="竖排文字占位符 2">
@@ -14421,8 +14421,8 @@
           </a:p>
         </p:txBody>
       </p:sp>
-      <mc:AlternateContent xmlns:mc="http://schemas.openxmlformats.org/markup-compatibility/2006">
-        <mc:Choice xmlns:a14="http://schemas.microsoft.com/office/drawing/2010/main" Requires="a14">
+      <mc:AlternateContent xmlns:mc="http://schemas.openxmlformats.org/markup-compatibility/2006" xmlns:a14="http://schemas.microsoft.com/office/drawing/2010/main">
+        <mc:Choice Requires="a14">
           <p:sp>
             <p:nvSpPr>
               <p:cNvPr id="3" name="竖排文字占位符 2">
@@ -14571,13 +14571,7 @@
                       <a:rPr lang="en-US" altLang="zh-CN" i="1" dirty="0" err="1">
                         <a:latin typeface="Cambria Math" panose="02040503050406030204" pitchFamily="18" charset="0"/>
                       </a:rPr>
-                      <m:t>𝑢</m:t>
-                    </m:r>
-                    <m:r>
-                      <a:rPr lang="en-US" altLang="zh-CN" i="1" dirty="0" err="1">
-                        <a:latin typeface="Cambria Math" panose="02040503050406030204" pitchFamily="18" charset="0"/>
-                      </a:rPr>
-                      <m:t>𝑡𝑎𝑡𝑖𝑜</m:t>
+                      <m:t>𝑢𝑡𝑎𝑡𝑖𝑜</m:t>
                     </m:r>
                     <m:r>
                       <m:rPr>
@@ -14834,7 +14828,7 @@
                     <m:func>
                       <m:funcPr>
                         <m:ctrlPr>
-                          <a:rPr lang="en-US" altLang="zh-CN">
+                          <a:rPr lang="en-US" altLang="zh-CN" i="1">
                             <a:latin typeface="Cambria Math" panose="02040503050406030204" pitchFamily="18" charset="0"/>
                           </a:rPr>
                         </m:ctrlPr>
@@ -14843,7 +14837,7 @@
                         <m:sSub>
                           <m:sSubPr>
                             <m:ctrlPr>
-                              <a:rPr lang="en-US" altLang="zh-CN">
+                              <a:rPr lang="en-US" altLang="zh-CN" i="1">
                                 <a:latin typeface="Cambria Math" panose="02040503050406030204" pitchFamily="18" charset="0"/>
                               </a:rPr>
                             </m:ctrlPr>
@@ -14888,7 +14882,7 @@
                         <m:sSub>
                           <m:sSubPr>
                             <m:ctrlPr>
-                              <a:rPr lang="en-US" altLang="zh-CN">
+                              <a:rPr lang="en-US" altLang="zh-CN" i="1">
                                 <a:latin typeface="Cambria Math" panose="02040503050406030204" pitchFamily="18" charset="0"/>
                               </a:rPr>
                             </m:ctrlPr>
@@ -14961,7 +14955,7 @@
                     <m:d>
                       <m:dPr>
                         <m:ctrlPr>
-                          <a:rPr lang="en-US" altLang="zh-CN">
+                          <a:rPr lang="en-US" altLang="zh-CN" i="1">
                             <a:latin typeface="Cambria Math" panose="02040503050406030204" pitchFamily="18" charset="0"/>
                           </a:rPr>
                         </m:ctrlPr>
@@ -14970,7 +14964,7 @@
                         <m:func>
                           <m:funcPr>
                             <m:ctrlPr>
-                              <a:rPr lang="en-US" altLang="zh-CN">
+                              <a:rPr lang="en-US" altLang="zh-CN" i="1">
                                 <a:latin typeface="Cambria Math" panose="02040503050406030204" pitchFamily="18" charset="0"/>
                               </a:rPr>
                             </m:ctrlPr>
@@ -14979,7 +14973,7 @@
                             <m:sSub>
                               <m:sSubPr>
                                 <m:ctrlPr>
-                                  <a:rPr lang="en-US" altLang="zh-CN">
+                                  <a:rPr lang="en-US" altLang="zh-CN" i="1">
                                     <a:latin typeface="Cambria Math" panose="02040503050406030204" pitchFamily="18" charset="0"/>
                                   </a:rPr>
                                 </m:ctrlPr>
@@ -15009,7 +15003,7 @@
                             <m:sSub>
                               <m:sSubPr>
                                 <m:ctrlPr>
-                                  <a:rPr lang="en-US" altLang="zh-CN">
+                                  <a:rPr lang="en-US" altLang="zh-CN" i="1">
                                     <a:latin typeface="Cambria Math" panose="02040503050406030204" pitchFamily="18" charset="0"/>
                                   </a:rPr>
                                 </m:ctrlPr>
@@ -15089,7 +15083,7 @@
             </p:txBody>
           </p:sp>
         </mc:Choice>
-        <mc:Fallback>
+        <mc:Fallback xmlns="">
           <p:sp>
             <p:nvSpPr>
               <p:cNvPr id="3" name="竖排文字占位符 2">
@@ -20015,7 +20009,7 @@
         </p:nvSpPr>
         <p:spPr>
           <a:xfrm>
-            <a:off x="1138946" y="5657761"/>
+            <a:off x="1086394" y="5666824"/>
             <a:ext cx="2264652" cy="369332"/>
           </a:xfrm>
           <a:prstGeom prst="rect">
@@ -20074,6 +20068,948 @@
           </a:p>
         </p:txBody>
       </p:sp>
+      <p:graphicFrame>
+        <p:nvGraphicFramePr>
+          <p:cNvPr id="3" name="表格 2">
+            <a:extLst>
+              <a:ext uri="{FF2B5EF4-FFF2-40B4-BE49-F238E27FC236}">
+                <a16:creationId xmlns:a16="http://schemas.microsoft.com/office/drawing/2014/main" id="{2948F877-337C-E743-ABCF-64BCE21B0E1C}"/>
+              </a:ext>
+            </a:extLst>
+          </p:cNvPr>
+          <p:cNvGraphicFramePr>
+            <a:graphicFrameLocks noGrp="1"/>
+          </p:cNvGraphicFramePr>
+          <p:nvPr>
+            <p:extLst>
+              <p:ext uri="{D42A27DB-BD31-4B8C-83A1-F6EECF244321}">
+                <p14:modId xmlns:p14="http://schemas.microsoft.com/office/powerpoint/2010/main" val="3993549370"/>
+              </p:ext>
+            </p:extLst>
+          </p:nvPr>
+        </p:nvGraphicFramePr>
+        <p:xfrm>
+          <a:off x="2635249" y="5743584"/>
+          <a:ext cx="9302751" cy="952500"/>
+        </p:xfrm>
+        <a:graphic>
+          <a:graphicData uri="http://schemas.openxmlformats.org/drawingml/2006/table">
+            <a:tbl>
+              <a:tblPr>
+                <a:tableStyleId>{5C22544A-7EE6-4342-B048-85BDC9FD1C3A}</a:tableStyleId>
+              </a:tblPr>
+              <a:tblGrid>
+                <a:gridCol w="1137965">
+                  <a:extLst>
+                    <a:ext uri="{9D8B030D-6E8A-4147-A177-3AD203B41FA5}">
+                      <a16:colId xmlns:a16="http://schemas.microsoft.com/office/drawing/2014/main" val="2287854058"/>
+                    </a:ext>
+                  </a:extLst>
+                </a:gridCol>
+                <a:gridCol w="1545020">
+                  <a:extLst>
+                    <a:ext uri="{9D8B030D-6E8A-4147-A177-3AD203B41FA5}">
+                      <a16:colId xmlns:a16="http://schemas.microsoft.com/office/drawing/2014/main" val="540904225"/>
+                    </a:ext>
+                  </a:extLst>
+                </a:gridCol>
+                <a:gridCol w="1534511">
+                  <a:extLst>
+                    <a:ext uri="{9D8B030D-6E8A-4147-A177-3AD203B41FA5}">
+                      <a16:colId xmlns:a16="http://schemas.microsoft.com/office/drawing/2014/main" val="1892300675"/>
+                    </a:ext>
+                  </a:extLst>
+                </a:gridCol>
+                <a:gridCol w="1418896">
+                  <a:extLst>
+                    <a:ext uri="{9D8B030D-6E8A-4147-A177-3AD203B41FA5}">
+                      <a16:colId xmlns:a16="http://schemas.microsoft.com/office/drawing/2014/main" val="483689333"/>
+                    </a:ext>
+                  </a:extLst>
+                </a:gridCol>
+                <a:gridCol w="1105489">
+                  <a:extLst>
+                    <a:ext uri="{9D8B030D-6E8A-4147-A177-3AD203B41FA5}">
+                      <a16:colId xmlns:a16="http://schemas.microsoft.com/office/drawing/2014/main" val="1937315449"/>
+                    </a:ext>
+                  </a:extLst>
+                </a:gridCol>
+                <a:gridCol w="1386970">
+                  <a:extLst>
+                    <a:ext uri="{9D8B030D-6E8A-4147-A177-3AD203B41FA5}">
+                      <a16:colId xmlns:a16="http://schemas.microsoft.com/office/drawing/2014/main" val="1562196728"/>
+                    </a:ext>
+                  </a:extLst>
+                </a:gridCol>
+                <a:gridCol w="1173900">
+                  <a:extLst>
+                    <a:ext uri="{9D8B030D-6E8A-4147-A177-3AD203B41FA5}">
+                      <a16:colId xmlns:a16="http://schemas.microsoft.com/office/drawing/2014/main" val="1093623974"/>
+                    </a:ext>
+                  </a:extLst>
+                </a:gridCol>
+              </a:tblGrid>
+              <a:tr h="190500">
+                <a:tc>
+                  <a:txBody>
+                    <a:bodyPr/>
+                    <a:lstStyle/>
+                    <a:p>
+                      <a:pPr algn="l" fontAlgn="b"/>
+                      <a:r>
+                        <a:rPr lang="en" sz="1100" u="none" strike="noStrike">
+                          <a:effectLst/>
+                        </a:rPr>
+                        <a:t>Algorithm</a:t>
+                      </a:r>
+                      <a:endParaRPr lang="en" sz="1100" b="0" i="0" u="none" strike="noStrike">
+                        <a:solidFill>
+                          <a:srgbClr val="000000"/>
+                        </a:solidFill>
+                        <a:effectLst/>
+                        <a:latin typeface="等线" panose="02010600030101010101" pitchFamily="2" charset="-122"/>
+                        <a:ea typeface="等线" panose="02010600030101010101" pitchFamily="2" charset="-122"/>
+                      </a:endParaRPr>
+                    </a:p>
+                  </a:txBody>
+                  <a:tcPr marL="9525" marR="9525" marT="9525" marB="0" anchor="b"/>
+                </a:tc>
+                <a:tc>
+                  <a:txBody>
+                    <a:bodyPr/>
+                    <a:lstStyle/>
+                    <a:p>
+                      <a:pPr algn="l" fontAlgn="b"/>
+                      <a:r>
+                        <a:rPr lang="en" sz="1100" u="none" strike="noStrike">
+                          <a:effectLst/>
+                        </a:rPr>
+                        <a:t>Time</a:t>
+                      </a:r>
+                      <a:endParaRPr lang="en" sz="1100" b="0" i="0" u="none" strike="noStrike">
+                        <a:solidFill>
+                          <a:srgbClr val="000000"/>
+                        </a:solidFill>
+                        <a:effectLst/>
+                        <a:latin typeface="等线" panose="02010600030101010101" pitchFamily="2" charset="-122"/>
+                        <a:ea typeface="等线" panose="02010600030101010101" pitchFamily="2" charset="-122"/>
+                      </a:endParaRPr>
+                    </a:p>
+                  </a:txBody>
+                  <a:tcPr marL="9525" marR="9525" marT="9525" marB="0" anchor="b"/>
+                </a:tc>
+                <a:tc>
+                  <a:txBody>
+                    <a:bodyPr/>
+                    <a:lstStyle/>
+                    <a:p>
+                      <a:pPr algn="l" fontAlgn="b"/>
+                      <a:r>
+                        <a:rPr lang="en" sz="1100" u="none" strike="noStrike">
+                          <a:effectLst/>
+                        </a:rPr>
+                        <a:t>DR</a:t>
+                      </a:r>
+                      <a:endParaRPr lang="en" sz="1100" b="0" i="0" u="none" strike="noStrike">
+                        <a:solidFill>
+                          <a:srgbClr val="000000"/>
+                        </a:solidFill>
+                        <a:effectLst/>
+                        <a:latin typeface="等线" panose="02010600030101010101" pitchFamily="2" charset="-122"/>
+                        <a:ea typeface="等线" panose="02010600030101010101" pitchFamily="2" charset="-122"/>
+                      </a:endParaRPr>
+                    </a:p>
+                  </a:txBody>
+                  <a:tcPr marL="9525" marR="9525" marT="9525" marB="0" anchor="b"/>
+                </a:tc>
+                <a:tc>
+                  <a:txBody>
+                    <a:bodyPr/>
+                    <a:lstStyle/>
+                    <a:p>
+                      <a:pPr algn="l" fontAlgn="b"/>
+                      <a:r>
+                        <a:rPr lang="en" sz="1100" u="none" strike="noStrike">
+                          <a:effectLst/>
+                        </a:rPr>
+                        <a:t>Validation</a:t>
+                      </a:r>
+                      <a:endParaRPr lang="en" sz="1100" b="0" i="0" u="none" strike="noStrike">
+                        <a:solidFill>
+                          <a:srgbClr val="000000"/>
+                        </a:solidFill>
+                        <a:effectLst/>
+                        <a:latin typeface="等线" panose="02010600030101010101" pitchFamily="2" charset="-122"/>
+                        <a:ea typeface="等线" panose="02010600030101010101" pitchFamily="2" charset="-122"/>
+                      </a:endParaRPr>
+                    </a:p>
+                  </a:txBody>
+                  <a:tcPr marL="9525" marR="9525" marT="9525" marB="0" anchor="b"/>
+                </a:tc>
+                <a:tc>
+                  <a:txBody>
+                    <a:bodyPr/>
+                    <a:lstStyle/>
+                    <a:p>
+                      <a:pPr algn="l" fontAlgn="b"/>
+                      <a:r>
+                        <a:rPr lang="en" sz="1100" u="none" strike="noStrike">
+                          <a:effectLst/>
+                        </a:rPr>
+                        <a:t>Classifier</a:t>
+                      </a:r>
+                      <a:endParaRPr lang="en" sz="1100" b="0" i="0" u="none" strike="noStrike">
+                        <a:solidFill>
+                          <a:srgbClr val="000000"/>
+                        </a:solidFill>
+                        <a:effectLst/>
+                        <a:latin typeface="等线" panose="02010600030101010101" pitchFamily="2" charset="-122"/>
+                        <a:ea typeface="等线" panose="02010600030101010101" pitchFamily="2" charset="-122"/>
+                      </a:endParaRPr>
+                    </a:p>
+                  </a:txBody>
+                  <a:tcPr marL="9525" marR="9525" marT="9525" marB="0" anchor="b"/>
+                </a:tc>
+                <a:tc>
+                  <a:txBody>
+                    <a:bodyPr/>
+                    <a:lstStyle/>
+                    <a:p>
+                      <a:pPr algn="l" fontAlgn="b"/>
+                      <a:r>
+                        <a:rPr lang="en" sz="1100" u="none" strike="noStrike">
+                          <a:effectLst/>
+                        </a:rPr>
+                        <a:t>AC</a:t>
+                      </a:r>
+                      <a:endParaRPr lang="en" sz="1100" b="0" i="0" u="none" strike="noStrike">
+                        <a:solidFill>
+                          <a:srgbClr val="000000"/>
+                        </a:solidFill>
+                        <a:effectLst/>
+                        <a:latin typeface="等线" panose="02010600030101010101" pitchFamily="2" charset="-122"/>
+                        <a:ea typeface="等线" panose="02010600030101010101" pitchFamily="2" charset="-122"/>
+                      </a:endParaRPr>
+                    </a:p>
+                  </a:txBody>
+                  <a:tcPr marL="9525" marR="9525" marT="9525" marB="0" anchor="b"/>
+                </a:tc>
+                <a:tc>
+                  <a:txBody>
+                    <a:bodyPr/>
+                    <a:lstStyle/>
+                    <a:p>
+                      <a:pPr algn="l" fontAlgn="b"/>
+                      <a:r>
+                        <a:rPr lang="en" sz="1100" u="none" strike="noStrike">
+                          <a:effectLst/>
+                        </a:rPr>
+                        <a:t>Acc Delta</a:t>
+                      </a:r>
+                      <a:endParaRPr lang="en" sz="1100" b="0" i="0" u="none" strike="noStrike">
+                        <a:solidFill>
+                          <a:srgbClr val="000000"/>
+                        </a:solidFill>
+                        <a:effectLst/>
+                        <a:latin typeface="等线" panose="02010600030101010101" pitchFamily="2" charset="-122"/>
+                        <a:ea typeface="等线" panose="02010600030101010101" pitchFamily="2" charset="-122"/>
+                      </a:endParaRPr>
+                    </a:p>
+                  </a:txBody>
+                  <a:tcPr marL="9525" marR="9525" marT="9525" marB="0" anchor="b"/>
+                </a:tc>
+                <a:extLst>
+                  <a:ext uri="{0D108BD9-81ED-4DB2-BD59-A6C34878D82A}">
+                    <a16:rowId xmlns:a16="http://schemas.microsoft.com/office/drawing/2014/main" val="686530732"/>
+                  </a:ext>
+                </a:extLst>
+              </a:tr>
+              <a:tr h="190500">
+                <a:tc>
+                  <a:txBody>
+                    <a:bodyPr/>
+                    <a:lstStyle/>
+                    <a:p>
+                      <a:pPr algn="l" fontAlgn="b"/>
+                      <a:r>
+                        <a:rPr lang="en" sz="1100" u="none" strike="noStrike">
+                          <a:effectLst/>
+                        </a:rPr>
+                        <a:t>LassoGA</a:t>
+                      </a:r>
+                      <a:endParaRPr lang="en" sz="1100" b="0" i="0" u="none" strike="noStrike">
+                        <a:solidFill>
+                          <a:srgbClr val="000000"/>
+                        </a:solidFill>
+                        <a:effectLst/>
+                        <a:latin typeface="等线" panose="02010600030101010101" pitchFamily="2" charset="-122"/>
+                        <a:ea typeface="等线" panose="02010600030101010101" pitchFamily="2" charset="-122"/>
+                      </a:endParaRPr>
+                    </a:p>
+                  </a:txBody>
+                  <a:tcPr marL="9525" marR="9525" marT="9525" marB="0" anchor="b"/>
+                </a:tc>
+                <a:tc>
+                  <a:txBody>
+                    <a:bodyPr/>
+                    <a:lstStyle/>
+                    <a:p>
+                      <a:pPr algn="r" fontAlgn="b"/>
+                      <a:r>
+                        <a:rPr lang="en-US" altLang="zh-CN" sz="1100" u="none" strike="noStrike">
+                          <a:effectLst/>
+                        </a:rPr>
+                        <a:t>7619.543461</a:t>
+                      </a:r>
+                      <a:endParaRPr lang="en-US" altLang="zh-CN" sz="1100" b="0" i="0" u="none" strike="noStrike">
+                        <a:solidFill>
+                          <a:srgbClr val="000000"/>
+                        </a:solidFill>
+                        <a:effectLst/>
+                        <a:latin typeface="等线" panose="02010600030101010101" pitchFamily="2" charset="-122"/>
+                        <a:ea typeface="等线" panose="02010600030101010101" pitchFamily="2" charset="-122"/>
+                      </a:endParaRPr>
+                    </a:p>
+                  </a:txBody>
+                  <a:tcPr marL="9525" marR="9525" marT="9525" marB="0" anchor="b"/>
+                </a:tc>
+                <a:tc>
+                  <a:txBody>
+                    <a:bodyPr/>
+                    <a:lstStyle/>
+                    <a:p>
+                      <a:pPr algn="r" fontAlgn="b"/>
+                      <a:r>
+                        <a:rPr lang="en-US" altLang="zh-CN" sz="1100" u="none" strike="noStrike">
+                          <a:effectLst/>
+                        </a:rPr>
+                        <a:t>0.9862</a:t>
+                      </a:r>
+                      <a:endParaRPr lang="en-US" altLang="zh-CN" sz="1100" b="0" i="0" u="none" strike="noStrike">
+                        <a:solidFill>
+                          <a:srgbClr val="000000"/>
+                        </a:solidFill>
+                        <a:effectLst/>
+                        <a:latin typeface="等线" panose="02010600030101010101" pitchFamily="2" charset="-122"/>
+                        <a:ea typeface="等线" panose="02010600030101010101" pitchFamily="2" charset="-122"/>
+                      </a:endParaRPr>
+                    </a:p>
+                  </a:txBody>
+                  <a:tcPr marL="9525" marR="9525" marT="9525" marB="0" anchor="b"/>
+                </a:tc>
+                <a:tc>
+                  <a:txBody>
+                    <a:bodyPr/>
+                    <a:lstStyle/>
+                    <a:p>
+                      <a:pPr algn="l" fontAlgn="b"/>
+                      <a:r>
+                        <a:rPr lang="en-US" altLang="zh-CN" sz="1100" u="none" strike="noStrike">
+                          <a:effectLst/>
+                        </a:rPr>
+                        <a:t>70%-30%</a:t>
+                      </a:r>
+                      <a:endParaRPr lang="en-US" altLang="zh-CN" sz="1100" b="0" i="0" u="none" strike="noStrike">
+                        <a:solidFill>
+                          <a:srgbClr val="000000"/>
+                        </a:solidFill>
+                        <a:effectLst/>
+                        <a:latin typeface="等线" panose="02010600030101010101" pitchFamily="2" charset="-122"/>
+                        <a:ea typeface="等线" panose="02010600030101010101" pitchFamily="2" charset="-122"/>
+                      </a:endParaRPr>
+                    </a:p>
+                  </a:txBody>
+                  <a:tcPr marL="9525" marR="9525" marT="9525" marB="0" anchor="b"/>
+                </a:tc>
+                <a:tc>
+                  <a:txBody>
+                    <a:bodyPr/>
+                    <a:lstStyle/>
+                    <a:p>
+                      <a:pPr algn="l" fontAlgn="b"/>
+                      <a:r>
+                        <a:rPr lang="en" sz="1100" u="none" strike="noStrike">
+                          <a:effectLst/>
+                        </a:rPr>
+                        <a:t>1nn</a:t>
+                      </a:r>
+                      <a:endParaRPr lang="en" sz="1100" b="0" i="0" u="none" strike="noStrike">
+                        <a:solidFill>
+                          <a:srgbClr val="000000"/>
+                        </a:solidFill>
+                        <a:effectLst/>
+                        <a:latin typeface="等线" panose="02010600030101010101" pitchFamily="2" charset="-122"/>
+                        <a:ea typeface="等线" panose="02010600030101010101" pitchFamily="2" charset="-122"/>
+                      </a:endParaRPr>
+                    </a:p>
+                  </a:txBody>
+                  <a:tcPr marL="9525" marR="9525" marT="9525" marB="0" anchor="b"/>
+                </a:tc>
+                <a:tc>
+                  <a:txBody>
+                    <a:bodyPr/>
+                    <a:lstStyle/>
+                    <a:p>
+                      <a:pPr algn="r" fontAlgn="b"/>
+                      <a:r>
+                        <a:rPr lang="en-US" altLang="zh-CN" sz="1100" u="none" strike="noStrike">
+                          <a:effectLst/>
+                        </a:rPr>
+                        <a:t>0.95</a:t>
+                      </a:r>
+                      <a:endParaRPr lang="en-US" altLang="zh-CN" sz="1100" b="0" i="0" u="none" strike="noStrike">
+                        <a:solidFill>
+                          <a:srgbClr val="006100"/>
+                        </a:solidFill>
+                        <a:effectLst/>
+                        <a:latin typeface="等线" panose="02010600030101010101" pitchFamily="2" charset="-122"/>
+                        <a:ea typeface="等线" panose="02010600030101010101" pitchFamily="2" charset="-122"/>
+                      </a:endParaRPr>
+                    </a:p>
+                  </a:txBody>
+                  <a:tcPr marL="9525" marR="9525" marT="9525" marB="0" anchor="b"/>
+                </a:tc>
+                <a:tc>
+                  <a:txBody>
+                    <a:bodyPr/>
+                    <a:lstStyle/>
+                    <a:p>
+                      <a:pPr algn="r" fontAlgn="b"/>
+                      <a:r>
+                        <a:rPr lang="en-US" altLang="zh-CN" sz="1100" u="none" strike="noStrike">
+                          <a:effectLst/>
+                        </a:rPr>
+                        <a:t>0</a:t>
+                      </a:r>
+                      <a:endParaRPr lang="en-US" altLang="zh-CN" sz="1100" b="0" i="0" u="none" strike="noStrike">
+                        <a:solidFill>
+                          <a:srgbClr val="006100"/>
+                        </a:solidFill>
+                        <a:effectLst/>
+                        <a:latin typeface="等线" panose="02010600030101010101" pitchFamily="2" charset="-122"/>
+                        <a:ea typeface="等线" panose="02010600030101010101" pitchFamily="2" charset="-122"/>
+                      </a:endParaRPr>
+                    </a:p>
+                  </a:txBody>
+                  <a:tcPr marL="9525" marR="9525" marT="9525" marB="0" anchor="b"/>
+                </a:tc>
+                <a:extLst>
+                  <a:ext uri="{0D108BD9-81ED-4DB2-BD59-A6C34878D82A}">
+                    <a16:rowId xmlns:a16="http://schemas.microsoft.com/office/drawing/2014/main" val="528773287"/>
+                  </a:ext>
+                </a:extLst>
+              </a:tr>
+              <a:tr h="190500">
+                <a:tc>
+                  <a:txBody>
+                    <a:bodyPr/>
+                    <a:lstStyle/>
+                    <a:p>
+                      <a:pPr algn="l" fontAlgn="b"/>
+                      <a:endParaRPr lang="zh-CN" altLang="en-US" sz="1100" b="0" i="0" u="none" strike="noStrike">
+                        <a:solidFill>
+                          <a:srgbClr val="000000"/>
+                        </a:solidFill>
+                        <a:effectLst/>
+                        <a:latin typeface="等线" panose="02010600030101010101" pitchFamily="2" charset="-122"/>
+                        <a:ea typeface="等线" panose="02010600030101010101" pitchFamily="2" charset="-122"/>
+                      </a:endParaRPr>
+                    </a:p>
+                  </a:txBody>
+                  <a:tcPr marL="9525" marR="9525" marT="9525" marB="0" anchor="b"/>
+                </a:tc>
+                <a:tc>
+                  <a:txBody>
+                    <a:bodyPr/>
+                    <a:lstStyle/>
+                    <a:p>
+                      <a:pPr algn="r" fontAlgn="b"/>
+                      <a:r>
+                        <a:rPr lang="en-US" altLang="zh-CN" sz="1100" u="none" strike="noStrike">
+                          <a:effectLst/>
+                        </a:rPr>
+                        <a:t>7478.968952</a:t>
+                      </a:r>
+                      <a:endParaRPr lang="en-US" altLang="zh-CN" sz="1100" b="0" i="0" u="none" strike="noStrike">
+                        <a:solidFill>
+                          <a:srgbClr val="000000"/>
+                        </a:solidFill>
+                        <a:effectLst/>
+                        <a:latin typeface="等线" panose="02010600030101010101" pitchFamily="2" charset="-122"/>
+                        <a:ea typeface="等线" panose="02010600030101010101" pitchFamily="2" charset="-122"/>
+                      </a:endParaRPr>
+                    </a:p>
+                  </a:txBody>
+                  <a:tcPr marL="9525" marR="9525" marT="9525" marB="0" anchor="b"/>
+                </a:tc>
+                <a:tc>
+                  <a:txBody>
+                    <a:bodyPr/>
+                    <a:lstStyle/>
+                    <a:p>
+                      <a:pPr algn="r" fontAlgn="b"/>
+                      <a:r>
+                        <a:rPr lang="en-US" altLang="zh-CN" sz="1100" u="none" strike="noStrike">
+                          <a:effectLst/>
+                        </a:rPr>
+                        <a:t>0.9892</a:t>
+                      </a:r>
+                      <a:endParaRPr lang="en-US" altLang="zh-CN" sz="1100" b="0" i="0" u="none" strike="noStrike">
+                        <a:solidFill>
+                          <a:srgbClr val="000000"/>
+                        </a:solidFill>
+                        <a:effectLst/>
+                        <a:latin typeface="等线" panose="02010600030101010101" pitchFamily="2" charset="-122"/>
+                        <a:ea typeface="等线" panose="02010600030101010101" pitchFamily="2" charset="-122"/>
+                      </a:endParaRPr>
+                    </a:p>
+                  </a:txBody>
+                  <a:tcPr marL="9525" marR="9525" marT="9525" marB="0" anchor="b"/>
+                </a:tc>
+                <a:tc>
+                  <a:txBody>
+                    <a:bodyPr/>
+                    <a:lstStyle/>
+                    <a:p>
+                      <a:pPr algn="l" fontAlgn="b"/>
+                      <a:r>
+                        <a:rPr lang="en-US" altLang="zh-CN" sz="1100" u="none" strike="noStrike">
+                          <a:effectLst/>
+                        </a:rPr>
+                        <a:t>70%-30%</a:t>
+                      </a:r>
+                      <a:endParaRPr lang="en-US" altLang="zh-CN" sz="1100" b="0" i="0" u="none" strike="noStrike">
+                        <a:solidFill>
+                          <a:srgbClr val="000000"/>
+                        </a:solidFill>
+                        <a:effectLst/>
+                        <a:latin typeface="等线" panose="02010600030101010101" pitchFamily="2" charset="-122"/>
+                        <a:ea typeface="等线" panose="02010600030101010101" pitchFamily="2" charset="-122"/>
+                      </a:endParaRPr>
+                    </a:p>
+                  </a:txBody>
+                  <a:tcPr marL="9525" marR="9525" marT="9525" marB="0" anchor="b"/>
+                </a:tc>
+                <a:tc>
+                  <a:txBody>
+                    <a:bodyPr/>
+                    <a:lstStyle/>
+                    <a:p>
+                      <a:pPr algn="l" fontAlgn="b"/>
+                      <a:r>
+                        <a:rPr lang="en" sz="1100" u="none" strike="noStrike">
+                          <a:effectLst/>
+                        </a:rPr>
+                        <a:t>5nn</a:t>
+                      </a:r>
+                      <a:endParaRPr lang="en" sz="1100" b="0" i="0" u="none" strike="noStrike">
+                        <a:solidFill>
+                          <a:srgbClr val="000000"/>
+                        </a:solidFill>
+                        <a:effectLst/>
+                        <a:latin typeface="等线" panose="02010600030101010101" pitchFamily="2" charset="-122"/>
+                        <a:ea typeface="等线" panose="02010600030101010101" pitchFamily="2" charset="-122"/>
+                      </a:endParaRPr>
+                    </a:p>
+                  </a:txBody>
+                  <a:tcPr marL="9525" marR="9525" marT="9525" marB="0" anchor="b"/>
+                </a:tc>
+                <a:tc>
+                  <a:txBody>
+                    <a:bodyPr/>
+                    <a:lstStyle/>
+                    <a:p>
+                      <a:pPr algn="r" fontAlgn="b"/>
+                      <a:r>
+                        <a:rPr lang="en-US" altLang="zh-CN" sz="1100" u="none" strike="noStrike">
+                          <a:effectLst/>
+                        </a:rPr>
+                        <a:t>0.966666667</a:t>
+                      </a:r>
+                      <a:endParaRPr lang="en-US" altLang="zh-CN" sz="1100" b="0" i="0" u="none" strike="noStrike">
+                        <a:solidFill>
+                          <a:srgbClr val="006100"/>
+                        </a:solidFill>
+                        <a:effectLst/>
+                        <a:latin typeface="等线" panose="02010600030101010101" pitchFamily="2" charset="-122"/>
+                        <a:ea typeface="等线" panose="02010600030101010101" pitchFamily="2" charset="-122"/>
+                      </a:endParaRPr>
+                    </a:p>
+                  </a:txBody>
+                  <a:tcPr marL="9525" marR="9525" marT="9525" marB="0" anchor="b"/>
+                </a:tc>
+                <a:tc>
+                  <a:txBody>
+                    <a:bodyPr/>
+                    <a:lstStyle/>
+                    <a:p>
+                      <a:pPr algn="r" fontAlgn="b"/>
+                      <a:r>
+                        <a:rPr lang="en-US" altLang="zh-CN" sz="1100" u="none" strike="noStrike">
+                          <a:effectLst/>
+                        </a:rPr>
+                        <a:t>0</a:t>
+                      </a:r>
+                      <a:endParaRPr lang="en-US" altLang="zh-CN" sz="1100" b="0" i="0" u="none" strike="noStrike">
+                        <a:solidFill>
+                          <a:srgbClr val="006100"/>
+                        </a:solidFill>
+                        <a:effectLst/>
+                        <a:latin typeface="等线" panose="02010600030101010101" pitchFamily="2" charset="-122"/>
+                        <a:ea typeface="等线" panose="02010600030101010101" pitchFamily="2" charset="-122"/>
+                      </a:endParaRPr>
+                    </a:p>
+                  </a:txBody>
+                  <a:tcPr marL="9525" marR="9525" marT="9525" marB="0" anchor="b"/>
+                </a:tc>
+                <a:extLst>
+                  <a:ext uri="{0D108BD9-81ED-4DB2-BD59-A6C34878D82A}">
+                    <a16:rowId xmlns:a16="http://schemas.microsoft.com/office/drawing/2014/main" val="2279270102"/>
+                  </a:ext>
+                </a:extLst>
+              </a:tr>
+              <a:tr h="190500">
+                <a:tc>
+                  <a:txBody>
+                    <a:bodyPr/>
+                    <a:lstStyle/>
+                    <a:p>
+                      <a:pPr algn="l" fontAlgn="b"/>
+                      <a:endParaRPr lang="zh-CN" altLang="en-US" sz="1100" b="0" i="0" u="none" strike="noStrike">
+                        <a:solidFill>
+                          <a:srgbClr val="000000"/>
+                        </a:solidFill>
+                        <a:effectLst/>
+                        <a:latin typeface="等线" panose="02010600030101010101" pitchFamily="2" charset="-122"/>
+                        <a:ea typeface="等线" panose="02010600030101010101" pitchFamily="2" charset="-122"/>
+                      </a:endParaRPr>
+                    </a:p>
+                  </a:txBody>
+                  <a:tcPr marL="9525" marR="9525" marT="9525" marB="0" anchor="b"/>
+                </a:tc>
+                <a:tc>
+                  <a:txBody>
+                    <a:bodyPr/>
+                    <a:lstStyle/>
+                    <a:p>
+                      <a:pPr algn="r" fontAlgn="b"/>
+                      <a:r>
+                        <a:rPr lang="en-US" altLang="zh-CN" sz="1100" u="none" strike="noStrike">
+                          <a:effectLst/>
+                        </a:rPr>
+                        <a:t>4854.783222</a:t>
+                      </a:r>
+                      <a:endParaRPr lang="en-US" altLang="zh-CN" sz="1100" b="0" i="0" u="none" strike="noStrike">
+                        <a:solidFill>
+                          <a:srgbClr val="000000"/>
+                        </a:solidFill>
+                        <a:effectLst/>
+                        <a:latin typeface="等线" panose="02010600030101010101" pitchFamily="2" charset="-122"/>
+                        <a:ea typeface="等线" panose="02010600030101010101" pitchFamily="2" charset="-122"/>
+                      </a:endParaRPr>
+                    </a:p>
+                  </a:txBody>
+                  <a:tcPr marL="9525" marR="9525" marT="9525" marB="0" anchor="b"/>
+                </a:tc>
+                <a:tc>
+                  <a:txBody>
+                    <a:bodyPr/>
+                    <a:lstStyle/>
+                    <a:p>
+                      <a:pPr algn="r" fontAlgn="b"/>
+                      <a:r>
+                        <a:rPr lang="en-US" altLang="zh-CN" sz="1100" u="none" strike="noStrike">
+                          <a:effectLst/>
+                        </a:rPr>
+                        <a:t>0.9894</a:t>
+                      </a:r>
+                      <a:endParaRPr lang="en-US" altLang="zh-CN" sz="1100" b="0" i="0" u="none" strike="noStrike">
+                        <a:solidFill>
+                          <a:srgbClr val="000000"/>
+                        </a:solidFill>
+                        <a:effectLst/>
+                        <a:latin typeface="等线" panose="02010600030101010101" pitchFamily="2" charset="-122"/>
+                        <a:ea typeface="等线" panose="02010600030101010101" pitchFamily="2" charset="-122"/>
+                      </a:endParaRPr>
+                    </a:p>
+                  </a:txBody>
+                  <a:tcPr marL="9525" marR="9525" marT="9525" marB="0" anchor="b"/>
+                </a:tc>
+                <a:tc>
+                  <a:txBody>
+                    <a:bodyPr/>
+                    <a:lstStyle/>
+                    <a:p>
+                      <a:pPr algn="l" fontAlgn="b"/>
+                      <a:r>
+                        <a:rPr lang="en-US" altLang="zh-CN" sz="1100" u="none" strike="noStrike">
+                          <a:effectLst/>
+                        </a:rPr>
+                        <a:t>70%-30%</a:t>
+                      </a:r>
+                      <a:endParaRPr lang="en-US" altLang="zh-CN" sz="1100" b="0" i="0" u="none" strike="noStrike">
+                        <a:solidFill>
+                          <a:srgbClr val="000000"/>
+                        </a:solidFill>
+                        <a:effectLst/>
+                        <a:latin typeface="等线" panose="02010600030101010101" pitchFamily="2" charset="-122"/>
+                        <a:ea typeface="等线" panose="02010600030101010101" pitchFamily="2" charset="-122"/>
+                      </a:endParaRPr>
+                    </a:p>
+                  </a:txBody>
+                  <a:tcPr marL="9525" marR="9525" marT="9525" marB="0" anchor="b"/>
+                </a:tc>
+                <a:tc>
+                  <a:txBody>
+                    <a:bodyPr/>
+                    <a:lstStyle/>
+                    <a:p>
+                      <a:pPr algn="l" fontAlgn="b"/>
+                      <a:r>
+                        <a:rPr lang="en" sz="1100" u="none" strike="noStrike">
+                          <a:effectLst/>
+                        </a:rPr>
+                        <a:t>SVM</a:t>
+                      </a:r>
+                      <a:endParaRPr lang="en" sz="1100" b="0" i="0" u="none" strike="noStrike">
+                        <a:solidFill>
+                          <a:srgbClr val="000000"/>
+                        </a:solidFill>
+                        <a:effectLst/>
+                        <a:latin typeface="等线" panose="02010600030101010101" pitchFamily="2" charset="-122"/>
+                        <a:ea typeface="等线" panose="02010600030101010101" pitchFamily="2" charset="-122"/>
+                      </a:endParaRPr>
+                    </a:p>
+                  </a:txBody>
+                  <a:tcPr marL="9525" marR="9525" marT="9525" marB="0" anchor="b"/>
+                </a:tc>
+                <a:tc>
+                  <a:txBody>
+                    <a:bodyPr/>
+                    <a:lstStyle/>
+                    <a:p>
+                      <a:pPr algn="r" fontAlgn="b"/>
+                      <a:r>
+                        <a:rPr lang="en-US" altLang="zh-CN" sz="1100" u="none" strike="noStrike">
+                          <a:effectLst/>
+                        </a:rPr>
+                        <a:t>0.983333333</a:t>
+                      </a:r>
+                      <a:endParaRPr lang="en-US" altLang="zh-CN" sz="1100" b="0" i="0" u="none" strike="noStrike">
+                        <a:solidFill>
+                          <a:srgbClr val="006100"/>
+                        </a:solidFill>
+                        <a:effectLst/>
+                        <a:latin typeface="等线" panose="02010600030101010101" pitchFamily="2" charset="-122"/>
+                        <a:ea typeface="等线" panose="02010600030101010101" pitchFamily="2" charset="-122"/>
+                      </a:endParaRPr>
+                    </a:p>
+                  </a:txBody>
+                  <a:tcPr marL="9525" marR="9525" marT="9525" marB="0" anchor="b"/>
+                </a:tc>
+                <a:tc>
+                  <a:txBody>
+                    <a:bodyPr/>
+                    <a:lstStyle/>
+                    <a:p>
+                      <a:pPr algn="r" fontAlgn="b"/>
+                      <a:r>
+                        <a:rPr lang="en-US" altLang="zh-CN" sz="1100" u="none" strike="noStrike">
+                          <a:effectLst/>
+                        </a:rPr>
+                        <a:t>0</a:t>
+                      </a:r>
+                      <a:endParaRPr lang="en-US" altLang="zh-CN" sz="1100" b="0" i="0" u="none" strike="noStrike">
+                        <a:solidFill>
+                          <a:srgbClr val="006100"/>
+                        </a:solidFill>
+                        <a:effectLst/>
+                        <a:latin typeface="等线" panose="02010600030101010101" pitchFamily="2" charset="-122"/>
+                        <a:ea typeface="等线" panose="02010600030101010101" pitchFamily="2" charset="-122"/>
+                      </a:endParaRPr>
+                    </a:p>
+                  </a:txBody>
+                  <a:tcPr marL="9525" marR="9525" marT="9525" marB="0" anchor="b"/>
+                </a:tc>
+                <a:extLst>
+                  <a:ext uri="{0D108BD9-81ED-4DB2-BD59-A6C34878D82A}">
+                    <a16:rowId xmlns:a16="http://schemas.microsoft.com/office/drawing/2014/main" val="206966938"/>
+                  </a:ext>
+                </a:extLst>
+              </a:tr>
+              <a:tr h="190500">
+                <a:tc>
+                  <a:txBody>
+                    <a:bodyPr/>
+                    <a:lstStyle/>
+                    <a:p>
+                      <a:pPr algn="l" fontAlgn="b"/>
+                      <a:endParaRPr lang="zh-CN" altLang="en-US" sz="1100" b="0" i="0" u="none" strike="noStrike">
+                        <a:solidFill>
+                          <a:srgbClr val="000000"/>
+                        </a:solidFill>
+                        <a:effectLst/>
+                        <a:latin typeface="等线" panose="02010600030101010101" pitchFamily="2" charset="-122"/>
+                        <a:ea typeface="等线" panose="02010600030101010101" pitchFamily="2" charset="-122"/>
+                      </a:endParaRPr>
+                    </a:p>
+                  </a:txBody>
+                  <a:tcPr marL="9525" marR="9525" marT="9525" marB="0" anchor="b"/>
+                </a:tc>
+                <a:tc>
+                  <a:txBody>
+                    <a:bodyPr/>
+                    <a:lstStyle/>
+                    <a:p>
+                      <a:pPr algn="r" fontAlgn="b"/>
+                      <a:r>
+                        <a:rPr lang="en-US" altLang="zh-CN" sz="1100" u="none" strike="noStrike">
+                          <a:effectLst/>
+                        </a:rPr>
+                        <a:t>4824.543592</a:t>
+                      </a:r>
+                      <a:endParaRPr lang="en-US" altLang="zh-CN" sz="1100" b="0" i="0" u="none" strike="noStrike">
+                        <a:solidFill>
+                          <a:srgbClr val="000000"/>
+                        </a:solidFill>
+                        <a:effectLst/>
+                        <a:latin typeface="等线" panose="02010600030101010101" pitchFamily="2" charset="-122"/>
+                        <a:ea typeface="等线" panose="02010600030101010101" pitchFamily="2" charset="-122"/>
+                      </a:endParaRPr>
+                    </a:p>
+                  </a:txBody>
+                  <a:tcPr marL="9525" marR="9525" marT="9525" marB="0" anchor="b"/>
+                </a:tc>
+                <a:tc>
+                  <a:txBody>
+                    <a:bodyPr/>
+                    <a:lstStyle/>
+                    <a:p>
+                      <a:pPr algn="r" fontAlgn="b"/>
+                      <a:r>
+                        <a:rPr lang="en-US" altLang="zh-CN" sz="1100" u="none" strike="noStrike">
+                          <a:effectLst/>
+                        </a:rPr>
+                        <a:t>0.9777</a:t>
+                      </a:r>
+                      <a:endParaRPr lang="en-US" altLang="zh-CN" sz="1100" b="0" i="0" u="none" strike="noStrike">
+                        <a:solidFill>
+                          <a:srgbClr val="000000"/>
+                        </a:solidFill>
+                        <a:effectLst/>
+                        <a:latin typeface="等线" panose="02010600030101010101" pitchFamily="2" charset="-122"/>
+                        <a:ea typeface="等线" panose="02010600030101010101" pitchFamily="2" charset="-122"/>
+                      </a:endParaRPr>
+                    </a:p>
+                  </a:txBody>
+                  <a:tcPr marL="9525" marR="9525" marT="9525" marB="0" anchor="b"/>
+                </a:tc>
+                <a:tc>
+                  <a:txBody>
+                    <a:bodyPr/>
+                    <a:lstStyle/>
+                    <a:p>
+                      <a:pPr algn="l" fontAlgn="b"/>
+                      <a:r>
+                        <a:rPr lang="en-US" altLang="zh-CN" sz="1100" u="none" strike="noStrike">
+                          <a:effectLst/>
+                        </a:rPr>
+                        <a:t>70%-30%</a:t>
+                      </a:r>
+                      <a:endParaRPr lang="en-US" altLang="zh-CN" sz="1100" b="0" i="0" u="none" strike="noStrike">
+                        <a:solidFill>
+                          <a:srgbClr val="000000"/>
+                        </a:solidFill>
+                        <a:effectLst/>
+                        <a:latin typeface="等线" panose="02010600030101010101" pitchFamily="2" charset="-122"/>
+                        <a:ea typeface="等线" panose="02010600030101010101" pitchFamily="2" charset="-122"/>
+                      </a:endParaRPr>
+                    </a:p>
+                  </a:txBody>
+                  <a:tcPr marL="9525" marR="9525" marT="9525" marB="0" anchor="b"/>
+                </a:tc>
+                <a:tc>
+                  <a:txBody>
+                    <a:bodyPr/>
+                    <a:lstStyle/>
+                    <a:p>
+                      <a:pPr algn="l" fontAlgn="b"/>
+                      <a:r>
+                        <a:rPr lang="en" sz="1100" u="none" strike="noStrike">
+                          <a:effectLst/>
+                        </a:rPr>
+                        <a:t>Cart</a:t>
+                      </a:r>
+                      <a:endParaRPr lang="en" sz="1100" b="0" i="0" u="none" strike="noStrike">
+                        <a:solidFill>
+                          <a:srgbClr val="000000"/>
+                        </a:solidFill>
+                        <a:effectLst/>
+                        <a:latin typeface="等线" panose="02010600030101010101" pitchFamily="2" charset="-122"/>
+                        <a:ea typeface="等线" panose="02010600030101010101" pitchFamily="2" charset="-122"/>
+                      </a:endParaRPr>
+                    </a:p>
+                  </a:txBody>
+                  <a:tcPr marL="9525" marR="9525" marT="9525" marB="0" anchor="b"/>
+                </a:tc>
+                <a:tc>
+                  <a:txBody>
+                    <a:bodyPr/>
+                    <a:lstStyle/>
+                    <a:p>
+                      <a:pPr algn="r" fontAlgn="b"/>
+                      <a:r>
+                        <a:rPr lang="en-US" altLang="zh-CN" sz="1100" u="none" strike="noStrike">
+                          <a:effectLst/>
+                        </a:rPr>
+                        <a:t>0.716666667</a:t>
+                      </a:r>
+                      <a:endParaRPr lang="en-US" altLang="zh-CN" sz="1100" b="0" i="0" u="none" strike="noStrike">
+                        <a:solidFill>
+                          <a:srgbClr val="000000"/>
+                        </a:solidFill>
+                        <a:effectLst/>
+                        <a:latin typeface="等线" panose="02010600030101010101" pitchFamily="2" charset="-122"/>
+                        <a:ea typeface="等线" panose="02010600030101010101" pitchFamily="2" charset="-122"/>
+                      </a:endParaRPr>
+                    </a:p>
+                  </a:txBody>
+                  <a:tcPr marL="9525" marR="9525" marT="9525" marB="0" anchor="b"/>
+                </a:tc>
+                <a:tc>
+                  <a:txBody>
+                    <a:bodyPr/>
+                    <a:lstStyle/>
+                    <a:p>
+                      <a:pPr algn="r" fontAlgn="b"/>
+                      <a:r>
+                        <a:rPr lang="en-US" altLang="zh-CN" sz="1100" u="none" strike="noStrike" dirty="0">
+                          <a:effectLst/>
+                        </a:rPr>
+                        <a:t>10.41666667</a:t>
+                      </a:r>
+                      <a:endParaRPr lang="en-US" altLang="zh-CN" sz="1100" b="0" i="0" u="none" strike="noStrike" dirty="0">
+                        <a:solidFill>
+                          <a:srgbClr val="000000"/>
+                        </a:solidFill>
+                        <a:effectLst/>
+                        <a:latin typeface="等线" panose="02010600030101010101" pitchFamily="2" charset="-122"/>
+                        <a:ea typeface="等线" panose="02010600030101010101" pitchFamily="2" charset="-122"/>
+                      </a:endParaRPr>
+                    </a:p>
+                  </a:txBody>
+                  <a:tcPr marL="9525" marR="9525" marT="9525" marB="0" anchor="b"/>
+                </a:tc>
+                <a:extLst>
+                  <a:ext uri="{0D108BD9-81ED-4DB2-BD59-A6C34878D82A}">
+                    <a16:rowId xmlns:a16="http://schemas.microsoft.com/office/drawing/2014/main" val="967942302"/>
+                  </a:ext>
+                </a:extLst>
+              </a:tr>
+            </a:tbl>
+          </a:graphicData>
+        </a:graphic>
+      </p:graphicFrame>
     </p:spTree>
     <p:extLst>
       <p:ext uri="{BB962C8B-B14F-4D97-AF65-F5344CB8AC3E}">

</xml_diff>